<commit_message>
Added things to the poster
</commit_message>
<xml_diff>
--- a/Doc/DIRECT-PULOLB-Poster.pptx
+++ b/Doc/DIRECT-PULOLB-Poster.pptx
@@ -4,6 +4,9 @@
   <p:sldMasterIdLst>
     <p:sldMasterId id="2147483684" r:id="rId1"/>
   </p:sldMasterIdLst>
+  <p:notesMasterIdLst>
+    <p:notesMasterId r:id="rId3"/>
+  </p:notesMasterIdLst>
   <p:sldIdLst>
     <p:sldId id="256" r:id="rId2"/>
   </p:sldIdLst>
@@ -112,6 +115,439 @@
 </p:presentation>
 </file>
 
+<file path=ppt/notesMasters/notesMaster1.xml><?xml version="1.0" encoding="utf-8"?>
+<p:notesMaster xmlns:a="http://schemas.openxmlformats.org/drawingml/2006/main" xmlns:r="http://schemas.openxmlformats.org/officeDocument/2006/relationships" xmlns:p="http://schemas.openxmlformats.org/presentationml/2006/main">
+  <p:cSld>
+    <p:bg>
+      <p:bgRef idx="1001">
+        <a:schemeClr val="bg1"/>
+      </p:bgRef>
+    </p:bg>
+    <p:spTree>
+      <p:nvGrpSpPr>
+        <p:cNvPr id="1" name=""/>
+        <p:cNvGrpSpPr/>
+        <p:nvPr/>
+      </p:nvGrpSpPr>
+      <p:grpSpPr>
+        <a:xfrm>
+          <a:off x="0" y="0"/>
+          <a:ext cx="0" cy="0"/>
+          <a:chOff x="0" y="0"/>
+          <a:chExt cx="0" cy="0"/>
+        </a:xfrm>
+      </p:grpSpPr>
+      <p:sp>
+        <p:nvSpPr>
+          <p:cNvPr id="2" name="Header Placeholder 1"/>
+          <p:cNvSpPr>
+            <a:spLocks noGrp="1"/>
+          </p:cNvSpPr>
+          <p:nvPr>
+            <p:ph type="hdr" sz="quarter"/>
+          </p:nvPr>
+        </p:nvSpPr>
+        <p:spPr>
+          <a:xfrm>
+            <a:off x="0" y="0"/>
+            <a:ext cx="2971800" cy="458788"/>
+          </a:xfrm>
+          <a:prstGeom prst="rect">
+            <a:avLst/>
+          </a:prstGeom>
+        </p:spPr>
+        <p:txBody>
+          <a:bodyPr vert="horz" lIns="91440" tIns="45720" rIns="91440" bIns="45720" rtlCol="0"/>
+          <a:lstStyle>
+            <a:lvl1pPr algn="l">
+              <a:defRPr sz="1200"/>
+            </a:lvl1pPr>
+          </a:lstStyle>
+          <a:p>
+            <a:endParaRPr lang="en-US"/>
+          </a:p>
+        </p:txBody>
+      </p:sp>
+      <p:sp>
+        <p:nvSpPr>
+          <p:cNvPr id="3" name="Date Placeholder 2"/>
+          <p:cNvSpPr>
+            <a:spLocks noGrp="1"/>
+          </p:cNvSpPr>
+          <p:nvPr>
+            <p:ph type="dt" idx="1"/>
+          </p:nvPr>
+        </p:nvSpPr>
+        <p:spPr>
+          <a:xfrm>
+            <a:off x="3884613" y="0"/>
+            <a:ext cx="2971800" cy="458788"/>
+          </a:xfrm>
+          <a:prstGeom prst="rect">
+            <a:avLst/>
+          </a:prstGeom>
+        </p:spPr>
+        <p:txBody>
+          <a:bodyPr vert="horz" lIns="91440" tIns="45720" rIns="91440" bIns="45720" rtlCol="0"/>
+          <a:lstStyle>
+            <a:lvl1pPr algn="r">
+              <a:defRPr sz="1200"/>
+            </a:lvl1pPr>
+          </a:lstStyle>
+          <a:p>
+            <a:fld id="{89E9B4A7-B942-44D2-A939-0CC6FAB87D1B}" type="datetimeFigureOut">
+              <a:rPr lang="en-US" smtClean="0"/>
+              <a:t>3/10/2018</a:t>
+            </a:fld>
+            <a:endParaRPr lang="en-US"/>
+          </a:p>
+        </p:txBody>
+      </p:sp>
+      <p:sp>
+        <p:nvSpPr>
+          <p:cNvPr id="4" name="Slide Image Placeholder 3"/>
+          <p:cNvSpPr>
+            <a:spLocks noGrp="1" noRot="1" noChangeAspect="1"/>
+          </p:cNvSpPr>
+          <p:nvPr>
+            <p:ph type="sldImg" idx="2"/>
+          </p:nvPr>
+        </p:nvSpPr>
+        <p:spPr>
+          <a:xfrm>
+            <a:off x="1371600" y="1143000"/>
+            <a:ext cx="4114800" cy="3086100"/>
+          </a:xfrm>
+          <a:prstGeom prst="rect">
+            <a:avLst/>
+          </a:prstGeom>
+          <a:noFill/>
+          <a:ln w="12700">
+            <a:solidFill>
+              <a:prstClr val="black"/>
+            </a:solidFill>
+          </a:ln>
+        </p:spPr>
+        <p:txBody>
+          <a:bodyPr vert="horz" lIns="91440" tIns="45720" rIns="91440" bIns="45720" rtlCol="0" anchor="ctr"/>
+          <a:lstStyle/>
+          <a:p>
+            <a:endParaRPr lang="en-US"/>
+          </a:p>
+        </p:txBody>
+      </p:sp>
+      <p:sp>
+        <p:nvSpPr>
+          <p:cNvPr id="5" name="Notes Placeholder 4"/>
+          <p:cNvSpPr>
+            <a:spLocks noGrp="1"/>
+          </p:cNvSpPr>
+          <p:nvPr>
+            <p:ph type="body" sz="quarter" idx="3"/>
+          </p:nvPr>
+        </p:nvSpPr>
+        <p:spPr>
+          <a:xfrm>
+            <a:off x="685800" y="4400550"/>
+            <a:ext cx="5486400" cy="3600450"/>
+          </a:xfrm>
+          <a:prstGeom prst="rect">
+            <a:avLst/>
+          </a:prstGeom>
+        </p:spPr>
+        <p:txBody>
+          <a:bodyPr vert="horz" lIns="91440" tIns="45720" rIns="91440" bIns="45720" rtlCol="0"/>
+          <a:lstStyle/>
+          <a:p>
+            <a:pPr lvl="0"/>
+            <a:r>
+              <a:rPr lang="en-US"/>
+              <a:t>Edit Master text styles</a:t>
+            </a:r>
+          </a:p>
+          <a:p>
+            <a:pPr lvl="1"/>
+            <a:r>
+              <a:rPr lang="en-US"/>
+              <a:t>Second level</a:t>
+            </a:r>
+          </a:p>
+          <a:p>
+            <a:pPr lvl="2"/>
+            <a:r>
+              <a:rPr lang="en-US"/>
+              <a:t>Third level</a:t>
+            </a:r>
+          </a:p>
+          <a:p>
+            <a:pPr lvl="3"/>
+            <a:r>
+              <a:rPr lang="en-US"/>
+              <a:t>Fourth level</a:t>
+            </a:r>
+          </a:p>
+          <a:p>
+            <a:pPr lvl="4"/>
+            <a:r>
+              <a:rPr lang="en-US"/>
+              <a:t>Fifth level</a:t>
+            </a:r>
+          </a:p>
+        </p:txBody>
+      </p:sp>
+      <p:sp>
+        <p:nvSpPr>
+          <p:cNvPr id="6" name="Footer Placeholder 5"/>
+          <p:cNvSpPr>
+            <a:spLocks noGrp="1"/>
+          </p:cNvSpPr>
+          <p:nvPr>
+            <p:ph type="ftr" sz="quarter" idx="4"/>
+          </p:nvPr>
+        </p:nvSpPr>
+        <p:spPr>
+          <a:xfrm>
+            <a:off x="0" y="8685213"/>
+            <a:ext cx="2971800" cy="458787"/>
+          </a:xfrm>
+          <a:prstGeom prst="rect">
+            <a:avLst/>
+          </a:prstGeom>
+        </p:spPr>
+        <p:txBody>
+          <a:bodyPr vert="horz" lIns="91440" tIns="45720" rIns="91440" bIns="45720" rtlCol="0" anchor="b"/>
+          <a:lstStyle>
+            <a:lvl1pPr algn="l">
+              <a:defRPr sz="1200"/>
+            </a:lvl1pPr>
+          </a:lstStyle>
+          <a:p>
+            <a:endParaRPr lang="en-US"/>
+          </a:p>
+        </p:txBody>
+      </p:sp>
+      <p:sp>
+        <p:nvSpPr>
+          <p:cNvPr id="7" name="Slide Number Placeholder 6"/>
+          <p:cNvSpPr>
+            <a:spLocks noGrp="1"/>
+          </p:cNvSpPr>
+          <p:nvPr>
+            <p:ph type="sldNum" sz="quarter" idx="5"/>
+          </p:nvPr>
+        </p:nvSpPr>
+        <p:spPr>
+          <a:xfrm>
+            <a:off x="3884613" y="8685213"/>
+            <a:ext cx="2971800" cy="458787"/>
+          </a:xfrm>
+          <a:prstGeom prst="rect">
+            <a:avLst/>
+          </a:prstGeom>
+        </p:spPr>
+        <p:txBody>
+          <a:bodyPr vert="horz" lIns="91440" tIns="45720" rIns="91440" bIns="45720" rtlCol="0" anchor="b"/>
+          <a:lstStyle>
+            <a:lvl1pPr algn="r">
+              <a:defRPr sz="1200"/>
+            </a:lvl1pPr>
+          </a:lstStyle>
+          <a:p>
+            <a:fld id="{C7CF0BB4-1AA2-493B-895B-0D4BD9649568}" type="slidenum">
+              <a:rPr lang="en-US" smtClean="0"/>
+              <a:t>‹#›</a:t>
+            </a:fld>
+            <a:endParaRPr lang="en-US"/>
+          </a:p>
+        </p:txBody>
+      </p:sp>
+    </p:spTree>
+    <p:extLst>
+      <p:ext uri="{BB962C8B-B14F-4D97-AF65-F5344CB8AC3E}">
+        <p14:creationId xmlns:p14="http://schemas.microsoft.com/office/powerpoint/2010/main" val="2573542224"/>
+      </p:ext>
+    </p:extLst>
+  </p:cSld>
+  <p:clrMap bg1="lt1" tx1="dk1" bg2="lt2" tx2="dk2" accent1="accent1" accent2="accent2" accent3="accent3" accent4="accent4" accent5="accent5" accent6="accent6" hlink="hlink" folHlink="folHlink"/>
+  <p:notesStyle>
+    <a:lvl1pPr marL="0" algn="l" defTabSz="914400" rtl="0" eaLnBrk="1" latinLnBrk="0" hangingPunct="1">
+      <a:defRPr sz="1200" kern="1200">
+        <a:solidFill>
+          <a:schemeClr val="tx1"/>
+        </a:solidFill>
+        <a:latin typeface="+mn-lt"/>
+        <a:ea typeface="+mn-ea"/>
+        <a:cs typeface="+mn-cs"/>
+      </a:defRPr>
+    </a:lvl1pPr>
+    <a:lvl2pPr marL="457200" algn="l" defTabSz="914400" rtl="0" eaLnBrk="1" latinLnBrk="0" hangingPunct="1">
+      <a:defRPr sz="1200" kern="1200">
+        <a:solidFill>
+          <a:schemeClr val="tx1"/>
+        </a:solidFill>
+        <a:latin typeface="+mn-lt"/>
+        <a:ea typeface="+mn-ea"/>
+        <a:cs typeface="+mn-cs"/>
+      </a:defRPr>
+    </a:lvl2pPr>
+    <a:lvl3pPr marL="914400" algn="l" defTabSz="914400" rtl="0" eaLnBrk="1" latinLnBrk="0" hangingPunct="1">
+      <a:defRPr sz="1200" kern="1200">
+        <a:solidFill>
+          <a:schemeClr val="tx1"/>
+        </a:solidFill>
+        <a:latin typeface="+mn-lt"/>
+        <a:ea typeface="+mn-ea"/>
+        <a:cs typeface="+mn-cs"/>
+      </a:defRPr>
+    </a:lvl3pPr>
+    <a:lvl4pPr marL="1371600" algn="l" defTabSz="914400" rtl="0" eaLnBrk="1" latinLnBrk="0" hangingPunct="1">
+      <a:defRPr sz="1200" kern="1200">
+        <a:solidFill>
+          <a:schemeClr val="tx1"/>
+        </a:solidFill>
+        <a:latin typeface="+mn-lt"/>
+        <a:ea typeface="+mn-ea"/>
+        <a:cs typeface="+mn-cs"/>
+      </a:defRPr>
+    </a:lvl4pPr>
+    <a:lvl5pPr marL="1828800" algn="l" defTabSz="914400" rtl="0" eaLnBrk="1" latinLnBrk="0" hangingPunct="1">
+      <a:defRPr sz="1200" kern="1200">
+        <a:solidFill>
+          <a:schemeClr val="tx1"/>
+        </a:solidFill>
+        <a:latin typeface="+mn-lt"/>
+        <a:ea typeface="+mn-ea"/>
+        <a:cs typeface="+mn-cs"/>
+      </a:defRPr>
+    </a:lvl5pPr>
+    <a:lvl6pPr marL="2286000" algn="l" defTabSz="914400" rtl="0" eaLnBrk="1" latinLnBrk="0" hangingPunct="1">
+      <a:defRPr sz="1200" kern="1200">
+        <a:solidFill>
+          <a:schemeClr val="tx1"/>
+        </a:solidFill>
+        <a:latin typeface="+mn-lt"/>
+        <a:ea typeface="+mn-ea"/>
+        <a:cs typeface="+mn-cs"/>
+      </a:defRPr>
+    </a:lvl6pPr>
+    <a:lvl7pPr marL="2743200" algn="l" defTabSz="914400" rtl="0" eaLnBrk="1" latinLnBrk="0" hangingPunct="1">
+      <a:defRPr sz="1200" kern="1200">
+        <a:solidFill>
+          <a:schemeClr val="tx1"/>
+        </a:solidFill>
+        <a:latin typeface="+mn-lt"/>
+        <a:ea typeface="+mn-ea"/>
+        <a:cs typeface="+mn-cs"/>
+      </a:defRPr>
+    </a:lvl7pPr>
+    <a:lvl8pPr marL="3200400" algn="l" defTabSz="914400" rtl="0" eaLnBrk="1" latinLnBrk="0" hangingPunct="1">
+      <a:defRPr sz="1200" kern="1200">
+        <a:solidFill>
+          <a:schemeClr val="tx1"/>
+        </a:solidFill>
+        <a:latin typeface="+mn-lt"/>
+        <a:ea typeface="+mn-ea"/>
+        <a:cs typeface="+mn-cs"/>
+      </a:defRPr>
+    </a:lvl8pPr>
+    <a:lvl9pPr marL="3657600" algn="l" defTabSz="914400" rtl="0" eaLnBrk="1" latinLnBrk="0" hangingPunct="1">
+      <a:defRPr sz="1200" kern="1200">
+        <a:solidFill>
+          <a:schemeClr val="tx1"/>
+        </a:solidFill>
+        <a:latin typeface="+mn-lt"/>
+        <a:ea typeface="+mn-ea"/>
+        <a:cs typeface="+mn-cs"/>
+      </a:defRPr>
+    </a:lvl9pPr>
+  </p:notesStyle>
+</p:notesMaster>
+</file>
+
+<file path=ppt/notesSlides/notesSlide1.xml><?xml version="1.0" encoding="utf-8"?>
+<p:notes xmlns:a="http://schemas.openxmlformats.org/drawingml/2006/main" xmlns:r="http://schemas.openxmlformats.org/officeDocument/2006/relationships" xmlns:p="http://schemas.openxmlformats.org/presentationml/2006/main">
+  <p:cSld>
+    <p:spTree>
+      <p:nvGrpSpPr>
+        <p:cNvPr id="1" name=""/>
+        <p:cNvGrpSpPr/>
+        <p:nvPr/>
+      </p:nvGrpSpPr>
+      <p:grpSpPr>
+        <a:xfrm>
+          <a:off x="0" y="0"/>
+          <a:ext cx="0" cy="0"/>
+          <a:chOff x="0" y="0"/>
+          <a:chExt cx="0" cy="0"/>
+        </a:xfrm>
+      </p:grpSpPr>
+      <p:sp>
+        <p:nvSpPr>
+          <p:cNvPr id="2" name="Slide Image Placeholder 1"/>
+          <p:cNvSpPr>
+            <a:spLocks noGrp="1" noRot="1" noChangeAspect="1"/>
+          </p:cNvSpPr>
+          <p:nvPr>
+            <p:ph type="sldImg"/>
+          </p:nvPr>
+        </p:nvSpPr>
+        <p:spPr/>
+      </p:sp>
+      <p:sp>
+        <p:nvSpPr>
+          <p:cNvPr id="3" name="Notes Placeholder 2"/>
+          <p:cNvSpPr>
+            <a:spLocks noGrp="1"/>
+          </p:cNvSpPr>
+          <p:nvPr>
+            <p:ph type="body" idx="1"/>
+          </p:nvPr>
+        </p:nvSpPr>
+        <p:spPr/>
+        <p:txBody>
+          <a:bodyPr/>
+          <a:lstStyle/>
+          <a:p>
+            <a:endParaRPr lang="en-US" dirty="0"/>
+          </a:p>
+        </p:txBody>
+      </p:sp>
+      <p:sp>
+        <p:nvSpPr>
+          <p:cNvPr id="4" name="Slide Number Placeholder 3"/>
+          <p:cNvSpPr>
+            <a:spLocks noGrp="1"/>
+          </p:cNvSpPr>
+          <p:nvPr>
+            <p:ph type="sldNum" sz="quarter" idx="10"/>
+          </p:nvPr>
+        </p:nvSpPr>
+        <p:spPr/>
+        <p:txBody>
+          <a:bodyPr/>
+          <a:lstStyle/>
+          <a:p>
+            <a:fld id="{C7CF0BB4-1AA2-493B-895B-0D4BD9649568}" type="slidenum">
+              <a:rPr lang="en-US" smtClean="0"/>
+              <a:t>1</a:t>
+            </a:fld>
+            <a:endParaRPr lang="en-US"/>
+          </a:p>
+        </p:txBody>
+      </p:sp>
+    </p:spTree>
+    <p:extLst>
+      <p:ext uri="{BB962C8B-B14F-4D97-AF65-F5344CB8AC3E}">
+        <p14:creationId xmlns:p14="http://schemas.microsoft.com/office/powerpoint/2010/main" val="1045851883"/>
+      </p:ext>
+    </p:extLst>
+  </p:cSld>
+  <p:clrMapOvr>
+    <a:masterClrMapping/>
+  </p:clrMapOvr>
+</p:notes>
+</file>
+
 <file path=ppt/slideLayouts/slideLayout1.xml><?xml version="1.0" encoding="utf-8"?>
 <p:sldLayout xmlns:a="http://schemas.openxmlformats.org/drawingml/2006/main" xmlns:r="http://schemas.openxmlformats.org/officeDocument/2006/relationships" xmlns:p="http://schemas.openxmlformats.org/presentationml/2006/main" type="title" preserve="1">
   <p:cSld name="Title Slide">
@@ -243,7 +679,7 @@
           <a:p>
             <a:fld id="{334C27A1-BEB2-C84C-8355-1158A44B1DD2}" type="datetimeFigureOut">
               <a:rPr lang="en-US" smtClean="0"/>
-              <a:t>3/8/2018</a:t>
+              <a:t>3/9/2018</a:t>
             </a:fld>
             <a:endParaRPr lang="en-US"/>
           </a:p>
@@ -413,7 +849,7 @@
           <a:p>
             <a:fld id="{334C27A1-BEB2-C84C-8355-1158A44B1DD2}" type="datetimeFigureOut">
               <a:rPr lang="en-US" smtClean="0"/>
-              <a:t>3/8/2018</a:t>
+              <a:t>3/9/2018</a:t>
             </a:fld>
             <a:endParaRPr lang="en-US"/>
           </a:p>
@@ -593,7 +1029,7 @@
           <a:p>
             <a:fld id="{334C27A1-BEB2-C84C-8355-1158A44B1DD2}" type="datetimeFigureOut">
               <a:rPr lang="en-US" smtClean="0"/>
-              <a:t>3/8/2018</a:t>
+              <a:t>3/9/2018</a:t>
             </a:fld>
             <a:endParaRPr lang="en-US"/>
           </a:p>
@@ -763,7 +1199,7 @@
           <a:p>
             <a:fld id="{334C27A1-BEB2-C84C-8355-1158A44B1DD2}" type="datetimeFigureOut">
               <a:rPr lang="en-US" smtClean="0"/>
-              <a:t>3/8/2018</a:t>
+              <a:t>3/9/2018</a:t>
             </a:fld>
             <a:endParaRPr lang="en-US"/>
           </a:p>
@@ -1007,7 +1443,7 @@
           <a:p>
             <a:fld id="{334C27A1-BEB2-C84C-8355-1158A44B1DD2}" type="datetimeFigureOut">
               <a:rPr lang="en-US" smtClean="0"/>
-              <a:t>3/8/2018</a:t>
+              <a:t>3/9/2018</a:t>
             </a:fld>
             <a:endParaRPr lang="en-US"/>
           </a:p>
@@ -1239,7 +1675,7 @@
           <a:p>
             <a:fld id="{334C27A1-BEB2-C84C-8355-1158A44B1DD2}" type="datetimeFigureOut">
               <a:rPr lang="en-US" smtClean="0"/>
-              <a:t>3/8/2018</a:t>
+              <a:t>3/9/2018</a:t>
             </a:fld>
             <a:endParaRPr lang="en-US"/>
           </a:p>
@@ -1606,7 +2042,7 @@
           <a:p>
             <a:fld id="{334C27A1-BEB2-C84C-8355-1158A44B1DD2}" type="datetimeFigureOut">
               <a:rPr lang="en-US" smtClean="0"/>
-              <a:t>3/8/2018</a:t>
+              <a:t>3/9/2018</a:t>
             </a:fld>
             <a:endParaRPr lang="en-US"/>
           </a:p>
@@ -1724,7 +2160,7 @@
           <a:p>
             <a:fld id="{334C27A1-BEB2-C84C-8355-1158A44B1DD2}" type="datetimeFigureOut">
               <a:rPr lang="en-US" smtClean="0"/>
-              <a:t>3/8/2018</a:t>
+              <a:t>3/9/2018</a:t>
             </a:fld>
             <a:endParaRPr lang="en-US"/>
           </a:p>
@@ -1819,7 +2255,7 @@
           <a:p>
             <a:fld id="{334C27A1-BEB2-C84C-8355-1158A44B1DD2}" type="datetimeFigureOut">
               <a:rPr lang="en-US" smtClean="0"/>
-              <a:t>3/8/2018</a:t>
+              <a:t>3/9/2018</a:t>
             </a:fld>
             <a:endParaRPr lang="en-US"/>
           </a:p>
@@ -2096,7 +2532,7 @@
           <a:p>
             <a:fld id="{334C27A1-BEB2-C84C-8355-1158A44B1DD2}" type="datetimeFigureOut">
               <a:rPr lang="en-US" smtClean="0"/>
-              <a:t>3/8/2018</a:t>
+              <a:t>3/9/2018</a:t>
             </a:fld>
             <a:endParaRPr lang="en-US"/>
           </a:p>
@@ -2353,7 +2789,7 @@
           <a:p>
             <a:fld id="{334C27A1-BEB2-C84C-8355-1158A44B1DD2}" type="datetimeFigureOut">
               <a:rPr lang="en-US" smtClean="0"/>
-              <a:t>3/8/2018</a:t>
+              <a:t>3/9/2018</a:t>
             </a:fld>
             <a:endParaRPr lang="en-US"/>
           </a:p>
@@ -2566,7 +3002,7 @@
           <a:p>
             <a:fld id="{334C27A1-BEB2-C84C-8355-1158A44B1DD2}" type="datetimeFigureOut">
               <a:rPr lang="en-US" smtClean="0"/>
-              <a:t>3/8/2018</a:t>
+              <a:t>3/9/2018</a:t>
             </a:fld>
             <a:endParaRPr lang="en-US"/>
           </a:p>
@@ -2986,7 +3422,7 @@
           <p:nvPr/>
         </p:nvPicPr>
         <p:blipFill>
-          <a:blip r:embed="rId2"/>
+          <a:blip r:embed="rId3"/>
           <a:stretch>
             <a:fillRect/>
           </a:stretch>
@@ -3149,8 +3585,8 @@
         </p:nvSpPr>
         <p:spPr>
           <a:xfrm>
-            <a:off x="8922385" y="80184"/>
-            <a:ext cx="23600228" cy="1323439"/>
+            <a:off x="8222154" y="922091"/>
+            <a:ext cx="26668877" cy="1323439"/>
           </a:xfrm>
           <a:prstGeom prst="rect">
             <a:avLst/>
@@ -3165,7 +3601,7 @@
           <a:p>
             <a:pPr algn="ctr"/>
             <a:r>
-              <a:rPr lang="en-US" sz="8000" b="1" dirty="0"/>
+              <a:rPr lang="en-US" sz="8000" b="1" cap="all" dirty="0"/>
               <a:t>Predicting usable lifetime of lithium-ion batteries</a:t>
             </a:r>
           </a:p>
@@ -3185,8 +3621,8 @@
         </p:nvSpPr>
         <p:spPr>
           <a:xfrm>
-            <a:off x="13276670" y="2656991"/>
-            <a:ext cx="23600228" cy="913007"/>
+            <a:off x="12581935" y="2314738"/>
+            <a:ext cx="18727330" cy="943038"/>
           </a:xfrm>
           <a:prstGeom prst="rect">
             <a:avLst/>
@@ -3215,7 +3651,7 @@
               <a:rPr lang="en-US" sz="5333" dirty="0">
                 <a:latin typeface="Helvetica" pitchFamily="2" charset="0"/>
               </a:rPr>
-              <a:t> X. Liu, Rossana X </a:t>
+              <a:t> Liu, Rossana </a:t>
             </a:r>
             <a:r>
               <a:rPr lang="en-US" sz="5333" dirty="0" err="1">
@@ -3227,29 +3663,8 @@
               <a:rPr lang="en-US" sz="5333" dirty="0">
                 <a:latin typeface="Helvetica" pitchFamily="2" charset="0"/>
               </a:rPr>
-              <a:t>, </a:t>
-            </a:r>
-            <a:r>
-              <a:rPr lang="en-US" sz="5333" dirty="0" err="1">
-                <a:latin typeface="Helvetica" pitchFamily="2" charset="0"/>
-              </a:rPr>
-              <a:t>Maitri</a:t>
-            </a:r>
-            <a:r>
-              <a:rPr lang="en-US" sz="5333" dirty="0">
-                <a:latin typeface="Helvetica" pitchFamily="2" charset="0"/>
-              </a:rPr>
-              <a:t> </a:t>
-            </a:r>
-            <a:r>
-              <a:rPr lang="en-US" sz="5333" dirty="0" err="1">
-                <a:latin typeface="Helvetica" pitchFamily="2" charset="0"/>
-              </a:rPr>
-              <a:t>Uppaluri</a:t>
-            </a:r>
-            <a:endParaRPr lang="en-US" sz="5333" dirty="0">
-              <a:latin typeface="Helvetica" pitchFamily="2" charset="0"/>
-            </a:endParaRPr>
+              <a:t>, Maitri Uppaluri</a:t>
+            </a:r>
           </a:p>
         </p:txBody>
       </p:sp>
@@ -3335,7 +3750,7 @@
           <p:nvPr/>
         </p:nvPicPr>
         <p:blipFill>
-          <a:blip r:embed="rId3"/>
+          <a:blip r:embed="rId4"/>
           <a:stretch>
             <a:fillRect/>
           </a:stretch>
@@ -3365,7 +3780,7 @@
           <p:nvPr/>
         </p:nvPicPr>
         <p:blipFill>
-          <a:blip r:embed="rId4">
+          <a:blip r:embed="rId5">
             <a:extLst>
               <a:ext uri="{28A0092B-C50C-407E-A947-70E740481C1C}">
                 <a14:useLocalDpi xmlns:a14="http://schemas.microsoft.com/office/drawing/2010/main" val="0"/>
@@ -3412,7 +3827,7 @@
           <p:nvPr/>
         </p:nvPicPr>
         <p:blipFill rotWithShape="1">
-          <a:blip r:embed="rId5">
+          <a:blip r:embed="rId6">
             <a:extLst>
               <a:ext uri="{28A0092B-C50C-407E-A947-70E740481C1C}">
                 <a14:useLocalDpi xmlns:a14="http://schemas.microsoft.com/office/drawing/2010/main" val="0"/>
@@ -3448,53 +3863,6 @@
             <a:extLst>
               <a:ext uri="{FF2B5EF4-FFF2-40B4-BE49-F238E27FC236}">
                 <a16:creationId xmlns:a16="http://schemas.microsoft.com/office/drawing/2014/main" id="{1DCCFB11-812F-42B4-8AFF-BB676565E6CB}"/>
-              </a:ext>
-            </a:extLst>
-          </p:cNvPr>
-          <p:cNvPicPr>
-            <a:picLocks noChangeAspect="1" noChangeArrowheads="1"/>
-          </p:cNvPicPr>
-          <p:nvPr/>
-        </p:nvPicPr>
-        <p:blipFill>
-          <a:blip r:embed="rId6">
-            <a:extLst>
-              <a:ext uri="{28A0092B-C50C-407E-A947-70E740481C1C}">
-                <a14:useLocalDpi xmlns:a14="http://schemas.microsoft.com/office/drawing/2010/main" val="0"/>
-              </a:ext>
-            </a:extLst>
-          </a:blip>
-          <a:srcRect/>
-          <a:stretch>
-            <a:fillRect/>
-          </a:stretch>
-        </p:blipFill>
-        <p:spPr bwMode="auto">
-          <a:xfrm>
-            <a:off x="17579249" y="29724379"/>
-            <a:ext cx="7954688" cy="2314091"/>
-          </a:xfrm>
-          <a:prstGeom prst="rect">
-            <a:avLst/>
-          </a:prstGeom>
-          <a:noFill/>
-          <a:extLst>
-            <a:ext uri="{909E8E84-426E-40DD-AFC4-6F175D3DCCD1}">
-              <a14:hiddenFill xmlns:a14="http://schemas.microsoft.com/office/drawing/2010/main">
-                <a:solidFill>
-                  <a:srgbClr val="FFFFFF"/>
-                </a:solidFill>
-              </a14:hiddenFill>
-            </a:ext>
-          </a:extLst>
-        </p:spPr>
-      </p:pic>
-      <p:pic>
-        <p:nvPicPr>
-          <p:cNvPr id="1038" name="Picture 14" descr="Related image">
-            <a:extLst>
-              <a:ext uri="{FF2B5EF4-FFF2-40B4-BE49-F238E27FC236}">
-                <a16:creationId xmlns:a16="http://schemas.microsoft.com/office/drawing/2014/main" id="{5DF6F6EB-0329-41FD-8F58-E999627B9188}"/>
               </a:ext>
             </a:extLst>
           </p:cNvPr>
@@ -3518,6 +3886,53 @@
         </p:blipFill>
         <p:spPr bwMode="auto">
           <a:xfrm>
+            <a:off x="17579249" y="29724379"/>
+            <a:ext cx="7954688" cy="2314091"/>
+          </a:xfrm>
+          <a:prstGeom prst="rect">
+            <a:avLst/>
+          </a:prstGeom>
+          <a:noFill/>
+          <a:extLst>
+            <a:ext uri="{909E8E84-426E-40DD-AFC4-6F175D3DCCD1}">
+              <a14:hiddenFill xmlns:a14="http://schemas.microsoft.com/office/drawing/2010/main">
+                <a:solidFill>
+                  <a:srgbClr val="FFFFFF"/>
+                </a:solidFill>
+              </a14:hiddenFill>
+            </a:ext>
+          </a:extLst>
+        </p:spPr>
+      </p:pic>
+      <p:pic>
+        <p:nvPicPr>
+          <p:cNvPr id="1038" name="Picture 14" descr="Related image">
+            <a:extLst>
+              <a:ext uri="{FF2B5EF4-FFF2-40B4-BE49-F238E27FC236}">
+                <a16:creationId xmlns:a16="http://schemas.microsoft.com/office/drawing/2014/main" id="{5DF6F6EB-0329-41FD-8F58-E999627B9188}"/>
+              </a:ext>
+            </a:extLst>
+          </p:cNvPr>
+          <p:cNvPicPr>
+            <a:picLocks noChangeAspect="1" noChangeArrowheads="1"/>
+          </p:cNvPicPr>
+          <p:nvPr/>
+        </p:nvPicPr>
+        <p:blipFill>
+          <a:blip r:embed="rId8">
+            <a:extLst>
+              <a:ext uri="{28A0092B-C50C-407E-A947-70E740481C1C}">
+                <a14:useLocalDpi xmlns:a14="http://schemas.microsoft.com/office/drawing/2010/main" val="0"/>
+              </a:ext>
+            </a:extLst>
+          </a:blip>
+          <a:srcRect/>
+          <a:stretch>
+            <a:fillRect/>
+          </a:stretch>
+        </p:blipFill>
+        <p:spPr bwMode="auto">
+          <a:xfrm>
             <a:off x="34479548" y="28921421"/>
             <a:ext cx="6691313" cy="1605915"/>
           </a:xfrm>
@@ -3630,7 +4045,7 @@
           <a:lstStyle/>
           <a:p>
             <a:pPr algn="ctr"/>
-            <a:endParaRPr lang="en-US"/>
+            <a:endParaRPr lang="en-US" dirty="0"/>
           </a:p>
         </p:txBody>
       </p:sp>
@@ -3728,7 +4143,7 @@
           <a:lstStyle/>
           <a:p>
             <a:pPr algn="ctr"/>
-            <a:endParaRPr lang="en-US"/>
+            <a:endParaRPr lang="en-US" dirty="0"/>
           </a:p>
         </p:txBody>
       </p:sp>
@@ -3746,8 +4161,8 @@
         </p:nvSpPr>
         <p:spPr>
           <a:xfrm>
-            <a:off x="1295400" y="5260552"/>
-            <a:ext cx="15527893" cy="1015663"/>
+            <a:off x="7912369" y="6465453"/>
+            <a:ext cx="8910924" cy="3785652"/>
           </a:xfrm>
           <a:prstGeom prst="rect">
             <a:avLst/>
@@ -3760,126 +4175,33 @@
           </a:bodyPr>
           <a:lstStyle/>
           <a:p>
-            <a:pPr algn="ctr"/>
+            <a:pPr marL="857250" indent="-857250" algn="just">
+              <a:buFont typeface="Arial" panose="020B0604020202020204" pitchFamily="34" charset="0"/>
+              <a:buChar char="•"/>
+            </a:pPr>
             <a:r>
               <a:rPr lang="en-US" sz="6000" dirty="0"/>
-              <a:t>Introduction</a:t>
-            </a:r>
-          </a:p>
-        </p:txBody>
-      </p:sp>
-      <p:sp>
-        <p:nvSpPr>
-          <p:cNvPr id="23" name="TextBox 22">
-            <a:extLst>
-              <a:ext uri="{FF2B5EF4-FFF2-40B4-BE49-F238E27FC236}">
-                <a16:creationId xmlns:a16="http://schemas.microsoft.com/office/drawing/2014/main" id="{6655E5E8-1E99-485A-8C89-9B83E0A6D2B9}"/>
-              </a:ext>
-            </a:extLst>
-          </p:cNvPr>
-          <p:cNvSpPr txBox="1"/>
-          <p:nvPr/>
-        </p:nvSpPr>
-        <p:spPr>
-          <a:xfrm>
-            <a:off x="1158438" y="15225821"/>
-            <a:ext cx="15527893" cy="4708981"/>
-          </a:xfrm>
-          <a:prstGeom prst="rect">
-            <a:avLst/>
-          </a:prstGeom>
-          <a:noFill/>
-        </p:spPr>
-        <p:txBody>
-          <a:bodyPr wrap="square" rtlCol="0">
-            <a:spAutoFit/>
-          </a:bodyPr>
-          <a:lstStyle/>
-          <a:p>
-            <a:pPr algn="ctr"/>
+              <a:t>What does the software do?</a:t>
+            </a:r>
+          </a:p>
+          <a:p>
+            <a:pPr marL="857250" indent="-857250" algn="just">
+              <a:buFont typeface="Arial" panose="020B0604020202020204" pitchFamily="34" charset="0"/>
+              <a:buChar char="•"/>
+            </a:pPr>
             <a:r>
               <a:rPr lang="en-US" sz="6000" dirty="0"/>
-              <a:t>Structure of the Data</a:t>
-            </a:r>
-          </a:p>
-          <a:p>
-            <a:pPr algn="ctr"/>
+              <a:t>Motivation</a:t>
+            </a:r>
+          </a:p>
+          <a:p>
+            <a:pPr marL="857250" indent="-857250" algn="just">
+              <a:buFont typeface="Arial" panose="020B0604020202020204" pitchFamily="34" charset="0"/>
+              <a:buChar char="•"/>
+            </a:pPr>
             <a:r>
               <a:rPr lang="en-US" sz="6000" dirty="0"/>
-              <a:t>What tools we used to clean it</a:t>
-            </a:r>
-          </a:p>
-          <a:p>
-            <a:pPr algn="ctr"/>
-            <a:endParaRPr lang="en-US" sz="6000" dirty="0"/>
-          </a:p>
-          <a:p>
-            <a:pPr algn="ctr"/>
-            <a:r>
-              <a:rPr lang="en-US" sz="6000" dirty="0"/>
-              <a:t>If we can get it, show high-res screenshot of </a:t>
-            </a:r>
-            <a:r>
-              <a:rPr lang="en-US" sz="6000" dirty="0" err="1"/>
-              <a:t>Matlab</a:t>
-            </a:r>
-            <a:r>
-              <a:rPr lang="en-US" sz="6000" dirty="0"/>
-              <a:t> Data </a:t>
-            </a:r>
-          </a:p>
-        </p:txBody>
-      </p:sp>
-      <p:sp>
-        <p:nvSpPr>
-          <p:cNvPr id="24" name="TextBox 23">
-            <a:extLst>
-              <a:ext uri="{FF2B5EF4-FFF2-40B4-BE49-F238E27FC236}">
-                <a16:creationId xmlns:a16="http://schemas.microsoft.com/office/drawing/2014/main" id="{56CF56C8-7ABD-4658-8183-083C9F785A3B}"/>
-              </a:ext>
-            </a:extLst>
-          </p:cNvPr>
-          <p:cNvSpPr txBox="1"/>
-          <p:nvPr/>
-        </p:nvSpPr>
-        <p:spPr>
-          <a:xfrm>
-            <a:off x="17801191" y="5306719"/>
-            <a:ext cx="24794609" cy="3785652"/>
-          </a:xfrm>
-          <a:prstGeom prst="rect">
-            <a:avLst/>
-          </a:prstGeom>
-          <a:noFill/>
-        </p:spPr>
-        <p:txBody>
-          <a:bodyPr wrap="square" rtlCol="0">
-            <a:spAutoFit/>
-          </a:bodyPr>
-          <a:lstStyle/>
-          <a:p>
-            <a:pPr algn="ctr"/>
-            <a:r>
-              <a:rPr lang="en-US" sz="6000" dirty="0"/>
-              <a:t>Cleaned data that is going to go into machine learning algorithm</a:t>
-            </a:r>
-          </a:p>
-          <a:p>
-            <a:pPr algn="ctr"/>
-            <a:r>
-              <a:rPr lang="en-US" sz="6000" dirty="0"/>
-              <a:t>Show graphs of our data</a:t>
-            </a:r>
-          </a:p>
-          <a:p>
-            <a:pPr algn="ctr"/>
-            <a:endParaRPr lang="en-US" sz="6000" dirty="0"/>
-          </a:p>
-          <a:p>
-            <a:pPr algn="ctr"/>
-            <a:r>
-              <a:rPr lang="en-US" sz="6000" dirty="0"/>
-              <a:t>Flow chart of what is going</a:t>
+              <a:t>(Write the story)</a:t>
             </a:r>
           </a:p>
         </p:txBody>
@@ -3898,8 +4220,8 @@
         </p:nvSpPr>
         <p:spPr>
           <a:xfrm>
-            <a:off x="17801191" y="15328646"/>
-            <a:ext cx="24794609" cy="8402300"/>
+            <a:off x="27067908" y="16307241"/>
+            <a:ext cx="15202309" cy="8894743"/>
           </a:xfrm>
           <a:prstGeom prst="rect">
             <a:avLst/>
@@ -3912,52 +4234,1266 @@
           </a:bodyPr>
           <a:lstStyle/>
           <a:p>
+            <a:pPr algn="just"/>
+            <a:r>
+              <a:rPr lang="en-US" sz="4400" dirty="0"/>
+              <a:t>What our machine learning is: Dynamic Time Warping using </a:t>
+            </a:r>
+            <a:r>
+              <a:rPr lang="en-US" sz="4400" dirty="0" err="1"/>
+              <a:t>FastDTW</a:t>
+            </a:r>
+            <a:endParaRPr lang="en-US" sz="4400" dirty="0"/>
+          </a:p>
+          <a:p>
+            <a:pPr marL="857250" indent="-857250" algn="just">
+              <a:buFont typeface="Arial" panose="020B0604020202020204" pitchFamily="34" charset="0"/>
+              <a:buChar char="•"/>
+            </a:pPr>
+            <a:r>
+              <a:rPr lang="en-US" sz="4400" dirty="0"/>
+              <a:t>Logo?</a:t>
+            </a:r>
+          </a:p>
+          <a:p>
+            <a:pPr algn="just"/>
+            <a:r>
+              <a:rPr lang="en-US" sz="4400" dirty="0"/>
+              <a:t>Using a KNN of sorts to sort distances to return full curve</a:t>
+            </a:r>
+          </a:p>
+          <a:p>
+            <a:pPr marL="857250" indent="-857250" algn="just">
+              <a:buFont typeface="Arial" panose="020B0604020202020204" pitchFamily="34" charset="0"/>
+              <a:buChar char="•"/>
+            </a:pPr>
+            <a:r>
+              <a:rPr lang="en-US" sz="4400" dirty="0"/>
+              <a:t>Used DTW in KNN to find the closest distances. </a:t>
+            </a:r>
+          </a:p>
+          <a:p>
+            <a:pPr marL="857250" indent="-857250" algn="just">
+              <a:buFont typeface="Arial" panose="020B0604020202020204" pitchFamily="34" charset="0"/>
+              <a:buChar char="•"/>
+            </a:pPr>
+            <a:r>
+              <a:rPr lang="en-US" sz="4400" dirty="0"/>
+              <a:t>DTW requires us to filter our voltages to min-max of partial curve, for better prediction. </a:t>
+            </a:r>
+          </a:p>
+          <a:p>
+            <a:pPr marL="857250" indent="-857250" algn="just">
+              <a:buFont typeface="Arial" panose="020B0604020202020204" pitchFamily="34" charset="0"/>
+              <a:buChar char="•"/>
+            </a:pPr>
+            <a:r>
+              <a:rPr lang="en-US" sz="4400" dirty="0"/>
+              <a:t>From the corresponding full curve, it calculates the capacity and hence the lifetime. </a:t>
+            </a:r>
+          </a:p>
+          <a:p>
+            <a:pPr algn="just"/>
+            <a:endParaRPr lang="en-US" sz="4400" dirty="0"/>
+          </a:p>
+          <a:p>
+            <a:pPr algn="just"/>
+            <a:endParaRPr lang="en-US" sz="4400" dirty="0"/>
+          </a:p>
+          <a:p>
+            <a:pPr algn="just"/>
+            <a:r>
+              <a:rPr lang="en-US" sz="4400" b="1" dirty="0">
+                <a:solidFill>
+                  <a:srgbClr val="EE2C23"/>
+                </a:solidFill>
+              </a:rPr>
+              <a:t>Ultimate goal of the user: Input any partial data curve and have our package predict the best corresponding full curve</a:t>
+            </a:r>
+          </a:p>
+        </p:txBody>
+      </p:sp>
+      <p:pic>
+        <p:nvPicPr>
+          <p:cNvPr id="30" name="Picture 29">
+            <a:extLst>
+              <a:ext uri="{FF2B5EF4-FFF2-40B4-BE49-F238E27FC236}">
+                <a16:creationId xmlns:a16="http://schemas.microsoft.com/office/drawing/2014/main" id="{7FA9F5A9-6E80-4268-B258-F536E9B38C28}"/>
+              </a:ext>
+            </a:extLst>
+          </p:cNvPr>
+          <p:cNvPicPr>
+            <a:picLocks noChangeAspect="1"/>
+          </p:cNvPicPr>
+          <p:nvPr/>
+        </p:nvPicPr>
+        <p:blipFill>
+          <a:blip r:embed="rId9"/>
+          <a:stretch>
+            <a:fillRect/>
+          </a:stretch>
+        </p:blipFill>
+        <p:spPr>
+          <a:xfrm>
+            <a:off x="36415932" y="8417033"/>
+            <a:ext cx="5486400" cy="5486400"/>
+          </a:xfrm>
+          <a:prstGeom prst="rect">
+            <a:avLst/>
+          </a:prstGeom>
+        </p:spPr>
+      </p:pic>
+      <p:pic>
+        <p:nvPicPr>
+          <p:cNvPr id="1024" name="Picture 1023">
+            <a:extLst>
+              <a:ext uri="{FF2B5EF4-FFF2-40B4-BE49-F238E27FC236}">
+                <a16:creationId xmlns:a16="http://schemas.microsoft.com/office/drawing/2014/main" id="{6CB9288F-669B-4879-9D17-31838A02A9D0}"/>
+              </a:ext>
+            </a:extLst>
+          </p:cNvPr>
+          <p:cNvPicPr>
+            <a:picLocks noChangeAspect="1"/>
+          </p:cNvPicPr>
+          <p:nvPr/>
+        </p:nvPicPr>
+        <p:blipFill>
+          <a:blip r:embed="rId10"/>
+          <a:stretch>
+            <a:fillRect/>
+          </a:stretch>
+        </p:blipFill>
+        <p:spPr>
+          <a:xfrm>
+            <a:off x="27434101" y="8274870"/>
+            <a:ext cx="5486400" cy="5486400"/>
+          </a:xfrm>
+          <a:prstGeom prst="rect">
+            <a:avLst/>
+          </a:prstGeom>
+        </p:spPr>
+      </p:pic>
+      <p:pic>
+        <p:nvPicPr>
+          <p:cNvPr id="1027" name="Picture 1026">
+            <a:extLst>
+              <a:ext uri="{FF2B5EF4-FFF2-40B4-BE49-F238E27FC236}">
+                <a16:creationId xmlns:a16="http://schemas.microsoft.com/office/drawing/2014/main" id="{29DE1069-C3D4-4184-82AA-6FC0CBB2AD85}"/>
+              </a:ext>
+            </a:extLst>
+          </p:cNvPr>
+          <p:cNvPicPr>
+            <a:picLocks noChangeAspect="1"/>
+          </p:cNvPicPr>
+          <p:nvPr/>
+        </p:nvPicPr>
+        <p:blipFill>
+          <a:blip r:embed="rId11"/>
+          <a:stretch>
+            <a:fillRect/>
+          </a:stretch>
+        </p:blipFill>
+        <p:spPr>
+          <a:xfrm>
+            <a:off x="18496993" y="16386707"/>
+            <a:ext cx="8028630" cy="4367906"/>
+          </a:xfrm>
+          <a:prstGeom prst="rect">
+            <a:avLst/>
+          </a:prstGeom>
+        </p:spPr>
+      </p:pic>
+      <p:pic>
+        <p:nvPicPr>
+          <p:cNvPr id="40" name="Imagen 3">
+            <a:extLst>
+              <a:ext uri="{FF2B5EF4-FFF2-40B4-BE49-F238E27FC236}">
+                <a16:creationId xmlns:a16="http://schemas.microsoft.com/office/drawing/2014/main" id="{2B885367-EB88-4E82-ACFC-2786F1F0E87C}"/>
+              </a:ext>
+            </a:extLst>
+          </p:cNvPr>
+          <p:cNvPicPr>
+            <a:picLocks noChangeAspect="1"/>
+          </p:cNvPicPr>
+          <p:nvPr/>
+        </p:nvPicPr>
+        <p:blipFill>
+          <a:blip r:embed="rId12">
+            <a:extLst>
+              <a:ext uri="{28A0092B-C50C-407E-A947-70E740481C1C}">
+                <a14:useLocalDpi xmlns:a14="http://schemas.microsoft.com/office/drawing/2010/main" val="0"/>
+              </a:ext>
+            </a:extLst>
+          </a:blip>
+          <a:stretch>
+            <a:fillRect/>
+          </a:stretch>
+        </p:blipFill>
+        <p:spPr>
+          <a:xfrm>
+            <a:off x="1869810" y="16250684"/>
+            <a:ext cx="2908340" cy="5102352"/>
+          </a:xfrm>
+          <a:prstGeom prst="rect">
+            <a:avLst/>
+          </a:prstGeom>
+          <a:effectLst/>
+        </p:spPr>
+      </p:pic>
+      <p:pic>
+        <p:nvPicPr>
+          <p:cNvPr id="41" name="Imagen 5">
+            <a:extLst>
+              <a:ext uri="{FF2B5EF4-FFF2-40B4-BE49-F238E27FC236}">
+                <a16:creationId xmlns:a16="http://schemas.microsoft.com/office/drawing/2014/main" id="{63DD8176-DD0B-4501-869B-1F8639E4AA33}"/>
+              </a:ext>
+            </a:extLst>
+          </p:cNvPr>
+          <p:cNvPicPr>
+            <a:picLocks noChangeAspect="1"/>
+          </p:cNvPicPr>
+          <p:nvPr/>
+        </p:nvPicPr>
+        <p:blipFill rotWithShape="1">
+          <a:blip r:embed="rId13">
+            <a:extLst>
+              <a:ext uri="{28A0092B-C50C-407E-A947-70E740481C1C}">
+                <a14:useLocalDpi xmlns:a14="http://schemas.microsoft.com/office/drawing/2010/main" val="0"/>
+              </a:ext>
+            </a:extLst>
+          </a:blip>
+          <a:srcRect r="27326"/>
+          <a:stretch/>
+        </p:blipFill>
+        <p:spPr>
+          <a:xfrm>
+            <a:off x="5767493" y="16361886"/>
+            <a:ext cx="7069889" cy="4991149"/>
+          </a:xfrm>
+          <a:prstGeom prst="rect">
+            <a:avLst/>
+          </a:prstGeom>
+        </p:spPr>
+      </p:pic>
+      <p:cxnSp>
+        <p:nvCxnSpPr>
+          <p:cNvPr id="42" name="Conector recto de flecha 7">
+            <a:extLst>
+              <a:ext uri="{FF2B5EF4-FFF2-40B4-BE49-F238E27FC236}">
+                <a16:creationId xmlns:a16="http://schemas.microsoft.com/office/drawing/2014/main" id="{951CDEC1-8978-48D6-8AC6-D757CF248948}"/>
+              </a:ext>
+            </a:extLst>
+          </p:cNvPr>
+          <p:cNvCxnSpPr>
+            <a:cxnSpLocks/>
+          </p:cNvCxnSpPr>
+          <p:nvPr/>
+        </p:nvCxnSpPr>
+        <p:spPr>
+          <a:xfrm flipV="1">
+            <a:off x="4778150" y="16845221"/>
+            <a:ext cx="946245" cy="663008"/>
+          </a:xfrm>
+          <a:prstGeom prst="straightConnector1">
+            <a:avLst/>
+          </a:prstGeom>
+          <a:ln w="38100">
+            <a:solidFill>
+              <a:srgbClr val="F57B67"/>
+            </a:solidFill>
+            <a:tailEnd type="triangle" w="lg" len="lg"/>
+          </a:ln>
+        </p:spPr>
+        <p:style>
+          <a:lnRef idx="1">
+            <a:schemeClr val="accent1"/>
+          </a:lnRef>
+          <a:fillRef idx="0">
+            <a:schemeClr val="accent1"/>
+          </a:fillRef>
+          <a:effectRef idx="0">
+            <a:schemeClr val="accent1"/>
+          </a:effectRef>
+          <a:fontRef idx="minor">
+            <a:schemeClr val="tx1"/>
+          </a:fontRef>
+        </p:style>
+      </p:cxnSp>
+      <p:cxnSp>
+        <p:nvCxnSpPr>
+          <p:cNvPr id="43" name="Conector recto de flecha 9">
+            <a:extLst>
+              <a:ext uri="{FF2B5EF4-FFF2-40B4-BE49-F238E27FC236}">
+                <a16:creationId xmlns:a16="http://schemas.microsoft.com/office/drawing/2014/main" id="{141AB52C-CAD0-405A-9053-65DA9D2FFC10}"/>
+              </a:ext>
+            </a:extLst>
+          </p:cNvPr>
+          <p:cNvCxnSpPr>
+            <a:cxnSpLocks/>
+          </p:cNvCxnSpPr>
+          <p:nvPr/>
+        </p:nvCxnSpPr>
+        <p:spPr>
+          <a:xfrm>
+            <a:off x="4778150" y="17508229"/>
+            <a:ext cx="825498" cy="3229168"/>
+          </a:xfrm>
+          <a:prstGeom prst="straightConnector1">
+            <a:avLst/>
+          </a:prstGeom>
+          <a:ln w="38100">
+            <a:solidFill>
+              <a:srgbClr val="F57B67"/>
+            </a:solidFill>
+            <a:tailEnd type="triangle" w="lg" len="lg"/>
+          </a:ln>
+        </p:spPr>
+        <p:style>
+          <a:lnRef idx="1">
+            <a:schemeClr val="accent1"/>
+          </a:lnRef>
+          <a:fillRef idx="0">
+            <a:schemeClr val="accent1"/>
+          </a:fillRef>
+          <a:effectRef idx="0">
+            <a:schemeClr val="accent1"/>
+          </a:effectRef>
+          <a:fontRef idx="minor">
+            <a:schemeClr val="tx1"/>
+          </a:fontRef>
+        </p:style>
+      </p:cxnSp>
+      <p:pic>
+        <p:nvPicPr>
+          <p:cNvPr id="1029" name="Picture 1028">
+            <a:extLst>
+              <a:ext uri="{FF2B5EF4-FFF2-40B4-BE49-F238E27FC236}">
+                <a16:creationId xmlns:a16="http://schemas.microsoft.com/office/drawing/2014/main" id="{B9B5D521-A390-4269-B52E-D549E4328DD6}"/>
+              </a:ext>
+            </a:extLst>
+          </p:cNvPr>
+          <p:cNvPicPr>
+            <a:picLocks noChangeAspect="1"/>
+          </p:cNvPicPr>
+          <p:nvPr/>
+        </p:nvPicPr>
+        <p:blipFill rotWithShape="1">
+          <a:blip r:embed="rId14"/>
+          <a:srcRect l="7470" r="51924"/>
+          <a:stretch/>
+        </p:blipFill>
+        <p:spPr>
+          <a:xfrm>
+            <a:off x="18425967" y="8203904"/>
+            <a:ext cx="5332619" cy="5628331"/>
+          </a:xfrm>
+          <a:prstGeom prst="rect">
+            <a:avLst/>
+          </a:prstGeom>
+        </p:spPr>
+      </p:pic>
+      <p:pic>
+        <p:nvPicPr>
+          <p:cNvPr id="1032" name="Picture 8" descr="File:Python-logo-notext.svg">
+            <a:extLst>
+              <a:ext uri="{FF2B5EF4-FFF2-40B4-BE49-F238E27FC236}">
+                <a16:creationId xmlns:a16="http://schemas.microsoft.com/office/drawing/2014/main" id="{CB44E58A-2629-421C-8227-E7035A5367FA}"/>
+              </a:ext>
+            </a:extLst>
+          </p:cNvPr>
+          <p:cNvPicPr>
+            <a:picLocks noChangeAspect="1" noChangeArrowheads="1"/>
+          </p:cNvPicPr>
+          <p:nvPr/>
+        </p:nvPicPr>
+        <p:blipFill>
+          <a:blip r:embed="rId15">
+            <a:extLst>
+              <a:ext uri="{28A0092B-C50C-407E-A947-70E740481C1C}">
+                <a14:useLocalDpi xmlns:a14="http://schemas.microsoft.com/office/drawing/2010/main" val="0"/>
+              </a:ext>
+            </a:extLst>
+          </a:blip>
+          <a:srcRect/>
+          <a:stretch>
+            <a:fillRect/>
+          </a:stretch>
+        </p:blipFill>
+        <p:spPr bwMode="auto">
+          <a:xfrm>
+            <a:off x="14350710" y="17322652"/>
+            <a:ext cx="2064735" cy="2064735"/>
+          </a:xfrm>
+          <a:prstGeom prst="rect">
+            <a:avLst/>
+          </a:prstGeom>
+          <a:noFill/>
+          <a:extLst>
+            <a:ext uri="{909E8E84-426E-40DD-AFC4-6F175D3DCCD1}">
+              <a14:hiddenFill xmlns:a14="http://schemas.microsoft.com/office/drawing/2010/main">
+                <a:solidFill>
+                  <a:srgbClr val="FFFFFF"/>
+                </a:solidFill>
+              </a14:hiddenFill>
+            </a:ext>
+          </a:extLst>
+        </p:spPr>
+      </p:pic>
+      <p:cxnSp>
+        <p:nvCxnSpPr>
+          <p:cNvPr id="49" name="Conector recto de flecha 7">
+            <a:extLst>
+              <a:ext uri="{FF2B5EF4-FFF2-40B4-BE49-F238E27FC236}">
+                <a16:creationId xmlns:a16="http://schemas.microsoft.com/office/drawing/2014/main" id="{E073B4F5-F147-4B28-88BB-F2792EE465EA}"/>
+              </a:ext>
+            </a:extLst>
+          </p:cNvPr>
+          <p:cNvCxnSpPr>
+            <a:cxnSpLocks/>
+          </p:cNvCxnSpPr>
+          <p:nvPr/>
+        </p:nvCxnSpPr>
+        <p:spPr>
+          <a:xfrm>
+            <a:off x="12985890" y="18367222"/>
+            <a:ext cx="1169563" cy="0"/>
+          </a:xfrm>
+          <a:prstGeom prst="straightConnector1">
+            <a:avLst/>
+          </a:prstGeom>
+          <a:ln w="38100">
+            <a:solidFill>
+              <a:schemeClr val="accent2"/>
+            </a:solidFill>
+            <a:tailEnd type="triangle" w="lg" len="lg"/>
+          </a:ln>
+        </p:spPr>
+        <p:style>
+          <a:lnRef idx="1">
+            <a:schemeClr val="accent1"/>
+          </a:lnRef>
+          <a:fillRef idx="0">
+            <a:schemeClr val="accent1"/>
+          </a:fillRef>
+          <a:effectRef idx="0">
+            <a:schemeClr val="accent1"/>
+          </a:effectRef>
+          <a:fontRef idx="minor">
+            <a:schemeClr val="tx1"/>
+          </a:fontRef>
+        </p:style>
+      </p:cxnSp>
+      <p:pic>
+        <p:nvPicPr>
+          <p:cNvPr id="1043" name="Picture 1042">
+            <a:extLst>
+              <a:ext uri="{FF2B5EF4-FFF2-40B4-BE49-F238E27FC236}">
+                <a16:creationId xmlns:a16="http://schemas.microsoft.com/office/drawing/2014/main" id="{B874E0EA-726A-4CB1-AD5E-CC4DF5DF8C0E}"/>
+              </a:ext>
+            </a:extLst>
+          </p:cNvPr>
+          <p:cNvPicPr>
+            <a:picLocks noChangeAspect="1"/>
+          </p:cNvPicPr>
+          <p:nvPr/>
+        </p:nvPicPr>
+        <p:blipFill>
+          <a:blip r:embed="rId16"/>
+          <a:stretch>
+            <a:fillRect/>
+          </a:stretch>
+        </p:blipFill>
+        <p:spPr>
+          <a:xfrm>
+            <a:off x="1706811" y="6451781"/>
+            <a:ext cx="5794148" cy="3850508"/>
+          </a:xfrm>
+          <a:prstGeom prst="rect">
+            <a:avLst/>
+          </a:prstGeom>
+        </p:spPr>
+      </p:pic>
+      <p:sp>
+        <p:nvSpPr>
+          <p:cNvPr id="59" name="TextBox 58">
+            <a:extLst>
+              <a:ext uri="{FF2B5EF4-FFF2-40B4-BE49-F238E27FC236}">
+                <a16:creationId xmlns:a16="http://schemas.microsoft.com/office/drawing/2014/main" id="{42756242-1AA6-4132-BF2D-4CBF138CC4BF}"/>
+              </a:ext>
+            </a:extLst>
+          </p:cNvPr>
+          <p:cNvSpPr txBox="1"/>
+          <p:nvPr/>
+        </p:nvSpPr>
+        <p:spPr>
+          <a:xfrm>
+            <a:off x="6021974" y="15225702"/>
+            <a:ext cx="6074744" cy="851297"/>
+          </a:xfrm>
+          <a:prstGeom prst="roundRect">
+            <a:avLst/>
+          </a:prstGeom>
+          <a:solidFill>
+            <a:srgbClr val="FFF1C9"/>
+          </a:solidFill>
+          <a:ln w="28575"/>
+        </p:spPr>
+        <p:style>
+          <a:lnRef idx="2">
+            <a:schemeClr val="dk1"/>
+          </a:lnRef>
+          <a:fillRef idx="1">
+            <a:schemeClr val="lt1"/>
+          </a:fillRef>
+          <a:effectRef idx="0">
+            <a:schemeClr val="dk1"/>
+          </a:effectRef>
+          <a:fontRef idx="minor">
+            <a:schemeClr val="dk1"/>
+          </a:fontRef>
+        </p:style>
+        <p:txBody>
+          <a:bodyPr wrap="square" rtlCol="0">
+            <a:spAutoFit/>
+          </a:bodyPr>
+          <a:lstStyle/>
+          <a:p>
             <a:pPr algn="ctr"/>
             <a:r>
-              <a:rPr lang="en-US" sz="6000" dirty="0"/>
-              <a:t>What our machine learning is: Dynamic Time Warping using </a:t>
-            </a:r>
-            <a:r>
-              <a:rPr lang="en-US" sz="6000" dirty="0" err="1"/>
-              <a:t>FastDTW</a:t>
-            </a:r>
-            <a:endParaRPr lang="en-US" sz="6000" dirty="0"/>
-          </a:p>
+              <a:rPr lang="en-US" sz="4400" b="1" dirty="0">
+                <a:solidFill>
+                  <a:schemeClr val="tx1"/>
+                </a:solidFill>
+              </a:rPr>
+              <a:t>Data Cleaning</a:t>
+            </a:r>
+          </a:p>
+        </p:txBody>
+      </p:sp>
+      <p:sp>
+        <p:nvSpPr>
+          <p:cNvPr id="60" name="TextBox 59">
+            <a:extLst>
+              <a:ext uri="{FF2B5EF4-FFF2-40B4-BE49-F238E27FC236}">
+                <a16:creationId xmlns:a16="http://schemas.microsoft.com/office/drawing/2014/main" id="{F7566698-04CE-4AF9-9733-C42A2EA9E78C}"/>
+              </a:ext>
+            </a:extLst>
+          </p:cNvPr>
+          <p:cNvSpPr txBox="1"/>
+          <p:nvPr/>
+        </p:nvSpPr>
+        <p:spPr>
+          <a:xfrm>
+            <a:off x="25885911" y="15226312"/>
+            <a:ext cx="8625168" cy="851297"/>
+          </a:xfrm>
+          <a:prstGeom prst="roundRect">
+            <a:avLst/>
+          </a:prstGeom>
+          <a:solidFill>
+            <a:srgbClr val="FFF1C9"/>
+          </a:solidFill>
+        </p:spPr>
+        <p:style>
+          <a:lnRef idx="2">
+            <a:schemeClr val="dk1"/>
+          </a:lnRef>
+          <a:fillRef idx="1">
+            <a:schemeClr val="lt1"/>
+          </a:fillRef>
+          <a:effectRef idx="0">
+            <a:schemeClr val="dk1"/>
+          </a:effectRef>
+          <a:fontRef idx="minor">
+            <a:schemeClr val="dk1"/>
+          </a:fontRef>
+        </p:style>
+        <p:txBody>
+          <a:bodyPr wrap="square" rtlCol="0">
+            <a:spAutoFit/>
+          </a:bodyPr>
+          <a:lstStyle/>
           <a:p>
             <a:pPr algn="ctr"/>
             <a:r>
-              <a:rPr lang="en-US" sz="6000" dirty="0"/>
-              <a:t>Using a KNN of sorts to sort distances to return full curve</a:t>
-            </a:r>
-          </a:p>
+              <a:rPr lang="en-US" sz="4400" b="1" dirty="0">
+                <a:solidFill>
+                  <a:schemeClr val="tx1"/>
+                </a:solidFill>
+              </a:rPr>
+              <a:t>How Does The Package Work?</a:t>
+            </a:r>
+          </a:p>
+        </p:txBody>
+      </p:sp>
+      <p:sp>
+        <p:nvSpPr>
+          <p:cNvPr id="61" name="TextBox 60">
+            <a:extLst>
+              <a:ext uri="{FF2B5EF4-FFF2-40B4-BE49-F238E27FC236}">
+                <a16:creationId xmlns:a16="http://schemas.microsoft.com/office/drawing/2014/main" id="{9E415DCB-FD47-41B3-A306-19861224F4B4}"/>
+              </a:ext>
+            </a:extLst>
+          </p:cNvPr>
+          <p:cNvSpPr txBox="1"/>
+          <p:nvPr/>
+        </p:nvSpPr>
+        <p:spPr>
+          <a:xfrm>
+            <a:off x="6098174" y="5241871"/>
+            <a:ext cx="6074744" cy="851297"/>
+          </a:xfrm>
+          <a:prstGeom prst="roundRect">
+            <a:avLst/>
+          </a:prstGeom>
+          <a:solidFill>
+            <a:srgbClr val="FFF1C9"/>
+          </a:solidFill>
+        </p:spPr>
+        <p:style>
+          <a:lnRef idx="2">
+            <a:schemeClr val="dk1"/>
+          </a:lnRef>
+          <a:fillRef idx="1">
+            <a:schemeClr val="lt1"/>
+          </a:fillRef>
+          <a:effectRef idx="0">
+            <a:schemeClr val="dk1"/>
+          </a:effectRef>
+          <a:fontRef idx="minor">
+            <a:schemeClr val="dk1"/>
+          </a:fontRef>
+        </p:style>
+        <p:txBody>
+          <a:bodyPr wrap="square" rtlCol="0">
+            <a:spAutoFit/>
+          </a:bodyPr>
+          <a:lstStyle/>
           <a:p>
             <a:pPr algn="ctr"/>
-            <a:endParaRPr lang="en-US" sz="6000" dirty="0"/>
-          </a:p>
+            <a:r>
+              <a:rPr lang="en-US" sz="4400" b="1" dirty="0">
+                <a:solidFill>
+                  <a:schemeClr val="tx1"/>
+                </a:solidFill>
+              </a:rPr>
+              <a:t>What Is PULOLB?</a:t>
+            </a:r>
+          </a:p>
+        </p:txBody>
+      </p:sp>
+      <p:sp>
+        <p:nvSpPr>
+          <p:cNvPr id="62" name="TextBox 61">
+            <a:extLst>
+              <a:ext uri="{FF2B5EF4-FFF2-40B4-BE49-F238E27FC236}">
+                <a16:creationId xmlns:a16="http://schemas.microsoft.com/office/drawing/2014/main" id="{BBC834D4-2156-4F60-9F9C-A1487C5AEA90}"/>
+              </a:ext>
+            </a:extLst>
+          </p:cNvPr>
+          <p:cNvSpPr txBox="1"/>
+          <p:nvPr/>
+        </p:nvSpPr>
+        <p:spPr>
+          <a:xfrm>
+            <a:off x="3025218" y="10323120"/>
+            <a:ext cx="3157333" cy="369332"/>
+          </a:xfrm>
+          <a:prstGeom prst="rect">
+            <a:avLst/>
+          </a:prstGeom>
+          <a:noFill/>
+        </p:spPr>
+        <p:txBody>
+          <a:bodyPr wrap="square" rtlCol="0">
+            <a:spAutoFit/>
+          </a:bodyPr>
+          <a:lstStyle/>
           <a:p>
             <a:pPr algn="ctr"/>
             <a:r>
-              <a:rPr lang="en-US" sz="6000" dirty="0"/>
-              <a:t>DTW requires us to filter our voltages to min-max of partial curve</a:t>
-            </a:r>
-          </a:p>
+              <a:rPr lang="en-US" dirty="0"/>
+              <a:t>  A graphite/LiCoO2 pouch cell</a:t>
+            </a:r>
+          </a:p>
+        </p:txBody>
+      </p:sp>
+      <p:sp>
+        <p:nvSpPr>
+          <p:cNvPr id="64" name="TextBox 63">
+            <a:extLst>
+              <a:ext uri="{FF2B5EF4-FFF2-40B4-BE49-F238E27FC236}">
+                <a16:creationId xmlns:a16="http://schemas.microsoft.com/office/drawing/2014/main" id="{8D32BE57-EA87-4235-A29E-0E7E33293017}"/>
+              </a:ext>
+            </a:extLst>
+          </p:cNvPr>
+          <p:cNvSpPr txBox="1"/>
+          <p:nvPr/>
+        </p:nvSpPr>
+        <p:spPr>
+          <a:xfrm>
+            <a:off x="1906965" y="21589348"/>
+            <a:ext cx="7069889" cy="4597003"/>
+          </a:xfrm>
+          <a:prstGeom prst="roundRect">
+            <a:avLst/>
+          </a:prstGeom>
+          <a:noFill/>
+          <a:ln>
+            <a:solidFill>
+              <a:schemeClr val="accent2">
+                <a:lumMod val="75000"/>
+              </a:schemeClr>
+            </a:solidFill>
+          </a:ln>
+        </p:spPr>
+        <p:txBody>
+          <a:bodyPr wrap="square" rtlCol="0">
+            <a:spAutoFit/>
+          </a:bodyPr>
+          <a:lstStyle/>
           <a:p>
             <a:pPr algn="ctr"/>
-            <a:endParaRPr lang="en-US" sz="6000" dirty="0"/>
+            <a:r>
+              <a:rPr lang="en-US" sz="4400" b="1" dirty="0"/>
+              <a:t>Tools used to clean the data:</a:t>
+            </a:r>
+          </a:p>
+          <a:p>
+            <a:pPr marL="571500" indent="-571500" algn="just">
+              <a:buFont typeface="Arial" panose="020B0604020202020204" pitchFamily="34" charset="0"/>
+              <a:buChar char="•"/>
+            </a:pPr>
+            <a:r>
+              <a:rPr lang="en-US" sz="4400" dirty="0" err="1"/>
+              <a:t>HDFStorage</a:t>
+            </a:r>
+            <a:r>
+              <a:rPr lang="en-US" sz="4400" dirty="0"/>
+              <a:t>:</a:t>
+            </a:r>
+          </a:p>
+          <a:p>
+            <a:pPr marL="571500" indent="-571500" algn="just">
+              <a:buFont typeface="Arial" panose="020B0604020202020204" pitchFamily="34" charset="0"/>
+              <a:buChar char="•"/>
+            </a:pPr>
+            <a:r>
+              <a:rPr lang="en-US" sz="4400" dirty="0"/>
+              <a:t>H5py:</a:t>
+            </a:r>
           </a:p>
           <a:p>
             <a:pPr algn="ctr"/>
-            <a:endParaRPr lang="en-US" sz="6000" dirty="0"/>
+            <a:endParaRPr lang="en-US" sz="4400" b="1" dirty="0"/>
           </a:p>
           <a:p>
             <a:pPr algn="ctr"/>
-            <a:endParaRPr lang="en-US" sz="6000" dirty="0"/>
-          </a:p>
+            <a:endParaRPr lang="en-US" sz="4400" b="1" dirty="0"/>
+          </a:p>
+        </p:txBody>
+      </p:sp>
+      <p:sp>
+        <p:nvSpPr>
+          <p:cNvPr id="65" name="TextBox 64">
+            <a:extLst>
+              <a:ext uri="{FF2B5EF4-FFF2-40B4-BE49-F238E27FC236}">
+                <a16:creationId xmlns:a16="http://schemas.microsoft.com/office/drawing/2014/main" id="{D91AD469-2653-41AE-A833-8DC36191902D}"/>
+              </a:ext>
+            </a:extLst>
+          </p:cNvPr>
+          <p:cNvSpPr txBox="1"/>
+          <p:nvPr/>
+        </p:nvSpPr>
+        <p:spPr>
+          <a:xfrm>
+            <a:off x="9345535" y="21596719"/>
+            <a:ext cx="7069889" cy="4597003"/>
+          </a:xfrm>
+          <a:prstGeom prst="roundRect">
+            <a:avLst/>
+          </a:prstGeom>
+          <a:ln>
+            <a:solidFill>
+              <a:schemeClr val="accent2">
+                <a:lumMod val="75000"/>
+              </a:schemeClr>
+            </a:solidFill>
+          </a:ln>
+        </p:spPr>
+        <p:style>
+          <a:lnRef idx="2">
+            <a:schemeClr val="dk1"/>
+          </a:lnRef>
+          <a:fillRef idx="1">
+            <a:schemeClr val="lt1"/>
+          </a:fillRef>
+          <a:effectRef idx="0">
+            <a:schemeClr val="dk1"/>
+          </a:effectRef>
+          <a:fontRef idx="minor">
+            <a:schemeClr val="dk1"/>
+          </a:fontRef>
+        </p:style>
+        <p:txBody>
+          <a:bodyPr wrap="square" rtlCol="0">
+            <a:spAutoFit/>
+          </a:bodyPr>
+          <a:lstStyle/>
           <a:p>
             <a:pPr algn="ctr"/>
             <a:r>
-              <a:rPr lang="en-US" sz="6000" dirty="0"/>
-              <a:t>Ultimate goal of the user: Input any partial data curve and have our package predict the best corresponding full curve</a:t>
+              <a:rPr lang="en-US" sz="4400" b="1" dirty="0"/>
+              <a:t>Steps to clean the data:</a:t>
+            </a:r>
+          </a:p>
+          <a:p>
+            <a:pPr algn="ctr"/>
+            <a:endParaRPr lang="en-US" sz="4400" b="1" dirty="0"/>
+          </a:p>
+          <a:p>
+            <a:pPr algn="ctr"/>
+            <a:endParaRPr lang="en-US" sz="4400" b="1" dirty="0"/>
+          </a:p>
+          <a:p>
+            <a:pPr algn="ctr"/>
+            <a:endParaRPr lang="en-US" sz="4400" b="1" dirty="0"/>
+          </a:p>
+          <a:p>
+            <a:pPr algn="ctr"/>
+            <a:endParaRPr lang="en-US" sz="4400" b="1" dirty="0"/>
+          </a:p>
+          <a:p>
+            <a:pPr algn="ctr"/>
+            <a:r>
+              <a:rPr lang="en-US" sz="4400" b="1" dirty="0"/>
+              <a:t> </a:t>
+            </a:r>
+          </a:p>
+        </p:txBody>
+      </p:sp>
+      <p:sp>
+        <p:nvSpPr>
+          <p:cNvPr id="74" name="TextBox 73">
+            <a:extLst>
+              <a:ext uri="{FF2B5EF4-FFF2-40B4-BE49-F238E27FC236}">
+                <a16:creationId xmlns:a16="http://schemas.microsoft.com/office/drawing/2014/main" id="{24D9B826-7368-4EC1-AC59-8293ABDBE609}"/>
+              </a:ext>
+            </a:extLst>
+          </p:cNvPr>
+          <p:cNvSpPr txBox="1"/>
+          <p:nvPr/>
+        </p:nvSpPr>
+        <p:spPr>
+          <a:xfrm>
+            <a:off x="25887490" y="5241871"/>
+            <a:ext cx="8625168" cy="851297"/>
+          </a:xfrm>
+          <a:prstGeom prst="roundRect">
+            <a:avLst/>
+          </a:prstGeom>
+          <a:solidFill>
+            <a:srgbClr val="FFF1C9"/>
+          </a:solidFill>
+        </p:spPr>
+        <p:style>
+          <a:lnRef idx="2">
+            <a:schemeClr val="dk1"/>
+          </a:lnRef>
+          <a:fillRef idx="1">
+            <a:schemeClr val="lt1"/>
+          </a:fillRef>
+          <a:effectRef idx="0">
+            <a:schemeClr val="dk1"/>
+          </a:effectRef>
+          <a:fontRef idx="minor">
+            <a:schemeClr val="dk1"/>
+          </a:fontRef>
+        </p:style>
+        <p:txBody>
+          <a:bodyPr wrap="square" rtlCol="0">
+            <a:spAutoFit/>
+          </a:bodyPr>
+          <a:lstStyle/>
+          <a:p>
+            <a:pPr algn="ctr"/>
+            <a:r>
+              <a:rPr lang="en-US" sz="4400" dirty="0">
+                <a:solidFill>
+                  <a:schemeClr val="tx1"/>
+                </a:solidFill>
+              </a:rPr>
+              <a:t>How Does The Package Work?</a:t>
+            </a:r>
+          </a:p>
+        </p:txBody>
+      </p:sp>
+      <p:sp>
+        <p:nvSpPr>
+          <p:cNvPr id="75" name="TextBox 74">
+            <a:extLst>
+              <a:ext uri="{FF2B5EF4-FFF2-40B4-BE49-F238E27FC236}">
+                <a16:creationId xmlns:a16="http://schemas.microsoft.com/office/drawing/2014/main" id="{0F11A2A7-B570-422E-A7E7-9C41FA2B04F9}"/>
+              </a:ext>
+            </a:extLst>
+          </p:cNvPr>
+          <p:cNvSpPr txBox="1"/>
+          <p:nvPr/>
+        </p:nvSpPr>
+        <p:spPr>
+          <a:xfrm>
+            <a:off x="23926843" y="6741373"/>
+            <a:ext cx="3429000" cy="5959138"/>
+          </a:xfrm>
+          <a:prstGeom prst="roundRect">
+            <a:avLst/>
+          </a:prstGeom>
+          <a:noFill/>
+          <a:ln>
+            <a:solidFill>
+              <a:schemeClr val="accent2">
+                <a:lumMod val="75000"/>
+              </a:schemeClr>
+            </a:solidFill>
+          </a:ln>
+        </p:spPr>
+        <p:txBody>
+          <a:bodyPr wrap="square" rtlCol="0">
+            <a:spAutoFit/>
+          </a:bodyPr>
+          <a:lstStyle/>
+          <a:p>
+            <a:pPr algn="ctr"/>
+            <a:r>
+              <a:rPr lang="en-US" sz="3000" dirty="0"/>
+              <a:t>The distance between the two time series are calculated using </a:t>
+            </a:r>
+            <a:r>
+              <a:rPr lang="en-US" sz="3000" b="1" dirty="0"/>
+              <a:t>DTW</a:t>
+            </a:r>
+            <a:r>
+              <a:rPr lang="en-US" sz="3000" dirty="0"/>
+              <a:t>, and using the </a:t>
+            </a:r>
+            <a:r>
+              <a:rPr lang="en-US" sz="3000" b="1" dirty="0"/>
+              <a:t>KNN algorithm</a:t>
+            </a:r>
+            <a:r>
+              <a:rPr lang="en-US" sz="3000" dirty="0"/>
+              <a:t>, the full curve that has the closest distance to the partial curve gives its cycle number. </a:t>
+            </a:r>
+          </a:p>
+        </p:txBody>
+      </p:sp>
+      <p:sp>
+        <p:nvSpPr>
+          <p:cNvPr id="76" name="TextBox 75">
+            <a:extLst>
+              <a:ext uri="{FF2B5EF4-FFF2-40B4-BE49-F238E27FC236}">
+                <a16:creationId xmlns:a16="http://schemas.microsoft.com/office/drawing/2014/main" id="{C6B71E88-6F18-4E34-B6E8-8D581590964A}"/>
+              </a:ext>
+            </a:extLst>
+          </p:cNvPr>
+          <p:cNvSpPr txBox="1"/>
+          <p:nvPr/>
+        </p:nvSpPr>
+        <p:spPr>
+          <a:xfrm>
+            <a:off x="32809898" y="8569164"/>
+            <a:ext cx="3429000" cy="4115157"/>
+          </a:xfrm>
+          <a:prstGeom prst="roundRect">
+            <a:avLst/>
+          </a:prstGeom>
+          <a:noFill/>
+          <a:ln>
+            <a:solidFill>
+              <a:schemeClr val="accent2">
+                <a:lumMod val="75000"/>
+              </a:schemeClr>
+            </a:solidFill>
+          </a:ln>
+        </p:spPr>
+        <p:txBody>
+          <a:bodyPr wrap="square" rtlCol="0">
+            <a:spAutoFit/>
+          </a:bodyPr>
+          <a:lstStyle/>
+          <a:p>
+            <a:pPr algn="ctr"/>
+            <a:r>
+              <a:rPr lang="en-US" sz="3000" dirty="0"/>
+              <a:t>Once the corresponding cycle number is predicted, the </a:t>
+            </a:r>
+            <a:r>
+              <a:rPr lang="en-US" sz="3000" b="1" dirty="0"/>
+              <a:t>capacity</a:t>
+            </a:r>
+            <a:r>
+              <a:rPr lang="en-US" sz="3000" dirty="0"/>
+              <a:t> of the battery, and the lifetime are determined.</a:t>
+            </a:r>
+            <a:endParaRPr lang="en-US" sz="3000" b="1" dirty="0">
+              <a:solidFill>
+                <a:schemeClr val="accent6">
+                  <a:lumMod val="75000"/>
+                </a:schemeClr>
+              </a:solidFill>
+            </a:endParaRPr>
+          </a:p>
+        </p:txBody>
+      </p:sp>
+      <p:cxnSp>
+        <p:nvCxnSpPr>
+          <p:cNvPr id="77" name="Conector recto de flecha 7">
+            <a:extLst>
+              <a:ext uri="{FF2B5EF4-FFF2-40B4-BE49-F238E27FC236}">
+                <a16:creationId xmlns:a16="http://schemas.microsoft.com/office/drawing/2014/main" id="{D681E5CB-6E72-4AF1-A130-A07CA3059F6A}"/>
+              </a:ext>
+            </a:extLst>
+          </p:cNvPr>
+          <p:cNvCxnSpPr>
+            <a:cxnSpLocks/>
+          </p:cNvCxnSpPr>
+          <p:nvPr/>
+        </p:nvCxnSpPr>
+        <p:spPr>
+          <a:xfrm>
+            <a:off x="24062315" y="12913953"/>
+            <a:ext cx="3432309" cy="0"/>
+          </a:xfrm>
+          <a:prstGeom prst="straightConnector1">
+            <a:avLst/>
+          </a:prstGeom>
+          <a:ln w="57150">
+            <a:solidFill>
+              <a:srgbClr val="F57B67"/>
+            </a:solidFill>
+            <a:tailEnd type="triangle" w="lg" len="lg"/>
+          </a:ln>
+        </p:spPr>
+        <p:style>
+          <a:lnRef idx="1">
+            <a:schemeClr val="accent1"/>
+          </a:lnRef>
+          <a:fillRef idx="0">
+            <a:schemeClr val="accent1"/>
+          </a:fillRef>
+          <a:effectRef idx="0">
+            <a:schemeClr val="accent1"/>
+          </a:effectRef>
+          <a:fontRef idx="minor">
+            <a:schemeClr val="tx1"/>
+          </a:fontRef>
+        </p:style>
+      </p:cxnSp>
+      <p:cxnSp>
+        <p:nvCxnSpPr>
+          <p:cNvPr id="79" name="Conector recto de flecha 7">
+            <a:extLst>
+              <a:ext uri="{FF2B5EF4-FFF2-40B4-BE49-F238E27FC236}">
+                <a16:creationId xmlns:a16="http://schemas.microsoft.com/office/drawing/2014/main" id="{6644BE53-64D0-404E-A07D-D24FA540BFA3}"/>
+              </a:ext>
+            </a:extLst>
+          </p:cNvPr>
+          <p:cNvCxnSpPr>
+            <a:cxnSpLocks/>
+          </p:cNvCxnSpPr>
+          <p:nvPr/>
+        </p:nvCxnSpPr>
+        <p:spPr>
+          <a:xfrm>
+            <a:off x="32763393" y="12913953"/>
+            <a:ext cx="3652539" cy="0"/>
+          </a:xfrm>
+          <a:prstGeom prst="straightConnector1">
+            <a:avLst/>
+          </a:prstGeom>
+          <a:ln w="57150">
+            <a:solidFill>
+              <a:srgbClr val="F57B67"/>
+            </a:solidFill>
+            <a:tailEnd type="triangle" w="lg" len="lg"/>
+          </a:ln>
+        </p:spPr>
+        <p:style>
+          <a:lnRef idx="1">
+            <a:schemeClr val="accent1"/>
+          </a:lnRef>
+          <a:fillRef idx="0">
+            <a:schemeClr val="accent1"/>
+          </a:fillRef>
+          <a:effectRef idx="0">
+            <a:schemeClr val="accent1"/>
+          </a:effectRef>
+          <a:fontRef idx="minor">
+            <a:schemeClr val="tx1"/>
+          </a:fontRef>
+        </p:style>
+      </p:cxnSp>
+      <p:sp>
+        <p:nvSpPr>
+          <p:cNvPr id="81" name="TextBox 80">
+            <a:extLst>
+              <a:ext uri="{FF2B5EF4-FFF2-40B4-BE49-F238E27FC236}">
+                <a16:creationId xmlns:a16="http://schemas.microsoft.com/office/drawing/2014/main" id="{94212855-10AB-4CE6-A8D3-4BAC8200DD0C}"/>
+              </a:ext>
+            </a:extLst>
+          </p:cNvPr>
+          <p:cNvSpPr txBox="1"/>
+          <p:nvPr/>
+        </p:nvSpPr>
+        <p:spPr>
+          <a:xfrm>
+            <a:off x="18496993" y="5303279"/>
+            <a:ext cx="5241076" cy="3166824"/>
+          </a:xfrm>
+          <a:prstGeom prst="roundRect">
+            <a:avLst/>
+          </a:prstGeom>
+          <a:noFill/>
+          <a:ln>
+            <a:solidFill>
+              <a:schemeClr val="accent2">
+                <a:lumMod val="75000"/>
+              </a:schemeClr>
+            </a:solidFill>
+          </a:ln>
+        </p:spPr>
+        <p:txBody>
+          <a:bodyPr wrap="square" rtlCol="0">
+            <a:spAutoFit/>
+          </a:bodyPr>
+          <a:lstStyle/>
+          <a:p>
+            <a:pPr algn="ctr"/>
+            <a:r>
+              <a:rPr lang="en-US" sz="3000" dirty="0"/>
+              <a:t>The </a:t>
+            </a:r>
+            <a:r>
+              <a:rPr lang="en-US" sz="3000" b="1" dirty="0" err="1">
+                <a:solidFill>
+                  <a:srgbClr val="C00000"/>
+                </a:solidFill>
+              </a:rPr>
+              <a:t>calce</a:t>
+            </a:r>
+            <a:r>
+              <a:rPr lang="en-US" sz="3000" b="1" dirty="0">
+                <a:solidFill>
+                  <a:srgbClr val="C00000"/>
+                </a:solidFill>
+              </a:rPr>
+              <a:t> </a:t>
+            </a:r>
+            <a:r>
+              <a:rPr lang="en-US" sz="3000" dirty="0"/>
+              <a:t>battery group has data of full charge/discharge curves across cycles that can be used to predict the cycle, the capacity and the lifetime of the user’s battery. </a:t>
+            </a:r>
+          </a:p>
+        </p:txBody>
+      </p:sp>
+      <p:sp>
+        <p:nvSpPr>
+          <p:cNvPr id="82" name="TextBox 81">
+            <a:extLst>
+              <a:ext uri="{FF2B5EF4-FFF2-40B4-BE49-F238E27FC236}">
+                <a16:creationId xmlns:a16="http://schemas.microsoft.com/office/drawing/2014/main" id="{7990D129-0232-46F9-9C35-D05FDC4CD527}"/>
+              </a:ext>
+            </a:extLst>
+          </p:cNvPr>
+          <p:cNvSpPr txBox="1"/>
+          <p:nvPr/>
+        </p:nvSpPr>
+        <p:spPr>
+          <a:xfrm>
+            <a:off x="36879424" y="5303279"/>
+            <a:ext cx="4239472" cy="1634490"/>
+          </a:xfrm>
+          <a:prstGeom prst="roundRect">
+            <a:avLst/>
+          </a:prstGeom>
+          <a:noFill/>
+          <a:ln>
+            <a:solidFill>
+              <a:schemeClr val="accent2">
+                <a:lumMod val="75000"/>
+              </a:schemeClr>
+            </a:solidFill>
+          </a:ln>
+        </p:spPr>
+        <p:txBody>
+          <a:bodyPr wrap="square" rtlCol="0">
+            <a:spAutoFit/>
+          </a:bodyPr>
+          <a:lstStyle/>
+          <a:p>
+            <a:pPr algn="just"/>
+            <a:r>
+              <a:rPr lang="en-US" sz="3000" dirty="0"/>
+              <a:t>The package finally gives an output that describes the …</a:t>
+            </a:r>
+          </a:p>
+        </p:txBody>
+      </p:sp>
+      <p:sp>
+        <p:nvSpPr>
+          <p:cNvPr id="83" name="TextBox 82">
+            <a:extLst>
+              <a:ext uri="{FF2B5EF4-FFF2-40B4-BE49-F238E27FC236}">
+                <a16:creationId xmlns:a16="http://schemas.microsoft.com/office/drawing/2014/main" id="{9232E7A0-D1DA-4568-A536-64ED97BC3CD2}"/>
+              </a:ext>
+            </a:extLst>
+          </p:cNvPr>
+          <p:cNvSpPr txBox="1"/>
+          <p:nvPr/>
+        </p:nvSpPr>
+        <p:spPr>
+          <a:xfrm>
+            <a:off x="27524100" y="6163249"/>
+            <a:ext cx="5195799" cy="2656046"/>
+          </a:xfrm>
+          <a:prstGeom prst="roundRect">
+            <a:avLst/>
+          </a:prstGeom>
+          <a:noFill/>
+          <a:ln>
+            <a:solidFill>
+              <a:schemeClr val="accent2">
+                <a:lumMod val="75000"/>
+              </a:schemeClr>
+            </a:solidFill>
+          </a:ln>
+        </p:spPr>
+        <p:txBody>
+          <a:bodyPr wrap="square" rtlCol="0">
+            <a:spAutoFit/>
+          </a:bodyPr>
+          <a:lstStyle/>
+          <a:p>
+            <a:pPr algn="ctr"/>
+            <a:r>
+              <a:rPr lang="en-US" sz="3000" dirty="0"/>
+              <a:t>The given </a:t>
+            </a:r>
+            <a:r>
+              <a:rPr lang="en-US" sz="3000" b="1" dirty="0"/>
+              <a:t>partial</a:t>
+            </a:r>
+            <a:r>
+              <a:rPr lang="en-US" sz="3000" dirty="0"/>
+              <a:t> charge or discharge curve is fitted into the bunch of </a:t>
+            </a:r>
+            <a:r>
+              <a:rPr lang="en-US" sz="3000" b="1" dirty="0"/>
+              <a:t>full</a:t>
+            </a:r>
+            <a:r>
+              <a:rPr lang="en-US" sz="3000" dirty="0"/>
+              <a:t> curves to predict the cycle number of the partial curve. </a:t>
             </a:r>
           </a:p>
         </p:txBody>
@@ -4234,4 +5770,299 @@
     </a:ext>
   </a:extLst>
 </a:theme>
+</file>
+
+<file path=ppt/theme/theme2.xml><?xml version="1.0" encoding="utf-8"?>
+<a:theme xmlns:a="http://schemas.openxmlformats.org/drawingml/2006/main" name="Office Theme">
+  <a:themeElements>
+    <a:clrScheme name="Office">
+      <a:dk1>
+        <a:sysClr val="windowText" lastClr="000000"/>
+      </a:dk1>
+      <a:lt1>
+        <a:sysClr val="window" lastClr="FFFFFF"/>
+      </a:lt1>
+      <a:dk2>
+        <a:srgbClr val="44546A"/>
+      </a:dk2>
+      <a:lt2>
+        <a:srgbClr val="E7E6E6"/>
+      </a:lt2>
+      <a:accent1>
+        <a:srgbClr val="4472C4"/>
+      </a:accent1>
+      <a:accent2>
+        <a:srgbClr val="ED7D31"/>
+      </a:accent2>
+      <a:accent3>
+        <a:srgbClr val="A5A5A5"/>
+      </a:accent3>
+      <a:accent4>
+        <a:srgbClr val="FFC000"/>
+      </a:accent4>
+      <a:accent5>
+        <a:srgbClr val="5B9BD5"/>
+      </a:accent5>
+      <a:accent6>
+        <a:srgbClr val="70AD47"/>
+      </a:accent6>
+      <a:hlink>
+        <a:srgbClr val="0563C1"/>
+      </a:hlink>
+      <a:folHlink>
+        <a:srgbClr val="954F72"/>
+      </a:folHlink>
+    </a:clrScheme>
+    <a:fontScheme name="Office">
+      <a:majorFont>
+        <a:latin typeface="Calibri Light" panose="020F0302020204030204"/>
+        <a:ea typeface=""/>
+        <a:cs typeface=""/>
+        <a:font script="Jpan" typeface="游ゴシック Light"/>
+        <a:font script="Hang" typeface="맑은 고딕"/>
+        <a:font script="Hans" typeface="等线 Light"/>
+        <a:font script="Hant" typeface="新細明體"/>
+        <a:font script="Arab" typeface="Times New Roman"/>
+        <a:font script="Hebr" typeface="Times New Roman"/>
+        <a:font script="Thai" typeface="Angsana New"/>
+        <a:font script="Ethi" typeface="Nyala"/>
+        <a:font script="Beng" typeface="Vrinda"/>
+        <a:font script="Gujr" typeface="Shruti"/>
+        <a:font script="Khmr" typeface="MoolBoran"/>
+        <a:font script="Knda" typeface="Tunga"/>
+        <a:font script="Guru" typeface="Raavi"/>
+        <a:font script="Cans" typeface="Euphemia"/>
+        <a:font script="Cher" typeface="Plantagenet Cherokee"/>
+        <a:font script="Yiii" typeface="Microsoft Yi Baiti"/>
+        <a:font script="Tibt" typeface="Microsoft Himalaya"/>
+        <a:font script="Thaa" typeface="MV Boli"/>
+        <a:font script="Deva" typeface="Mangal"/>
+        <a:font script="Telu" typeface="Gautami"/>
+        <a:font script="Taml" typeface="Latha"/>
+        <a:font script="Syrc" typeface="Estrangelo Edessa"/>
+        <a:font script="Orya" typeface="Kalinga"/>
+        <a:font script="Mlym" typeface="Kartika"/>
+        <a:font script="Laoo" typeface="DokChampa"/>
+        <a:font script="Sinh" typeface="Iskoola Pota"/>
+        <a:font script="Mong" typeface="Mongolian Baiti"/>
+        <a:font script="Viet" typeface="Times New Roman"/>
+        <a:font script="Uigh" typeface="Microsoft Uighur"/>
+        <a:font script="Geor" typeface="Sylfaen"/>
+        <a:font script="Armn" typeface="Arial"/>
+        <a:font script="Bugi" typeface="Leelawadee UI"/>
+        <a:font script="Bopo" typeface="Microsoft JhengHei"/>
+        <a:font script="Java" typeface="Javanese Text"/>
+        <a:font script="Lisu" typeface="Segoe UI"/>
+        <a:font script="Mymr" typeface="Myanmar Text"/>
+        <a:font script="Nkoo" typeface="Ebrima"/>
+        <a:font script="Olck" typeface="Nirmala UI"/>
+        <a:font script="Osma" typeface="Ebrima"/>
+        <a:font script="Phag" typeface="Phagspa"/>
+        <a:font script="Syrn" typeface="Estrangelo Edessa"/>
+        <a:font script="Syrj" typeface="Estrangelo Edessa"/>
+        <a:font script="Syre" typeface="Estrangelo Edessa"/>
+        <a:font script="Sora" typeface="Nirmala UI"/>
+        <a:font script="Tale" typeface="Microsoft Tai Le"/>
+        <a:font script="Talu" typeface="Microsoft New Tai Lue"/>
+        <a:font script="Tfng" typeface="Ebrima"/>
+      </a:majorFont>
+      <a:minorFont>
+        <a:latin typeface="Calibri" panose="020F0502020204030204"/>
+        <a:ea typeface=""/>
+        <a:cs typeface=""/>
+        <a:font script="Jpan" typeface="游ゴシック"/>
+        <a:font script="Hang" typeface="맑은 고딕"/>
+        <a:font script="Hans" typeface="等线"/>
+        <a:font script="Hant" typeface="新細明體"/>
+        <a:font script="Arab" typeface="Arial"/>
+        <a:font script="Hebr" typeface="Arial"/>
+        <a:font script="Thai" typeface="Cordia New"/>
+        <a:font script="Ethi" typeface="Nyala"/>
+        <a:font script="Beng" typeface="Vrinda"/>
+        <a:font script="Gujr" typeface="Shruti"/>
+        <a:font script="Khmr" typeface="DaunPenh"/>
+        <a:font script="Knda" typeface="Tunga"/>
+        <a:font script="Guru" typeface="Raavi"/>
+        <a:font script="Cans" typeface="Euphemia"/>
+        <a:font script="Cher" typeface="Plantagenet Cherokee"/>
+        <a:font script="Yiii" typeface="Microsoft Yi Baiti"/>
+        <a:font script="Tibt" typeface="Microsoft Himalaya"/>
+        <a:font script="Thaa" typeface="MV Boli"/>
+        <a:font script="Deva" typeface="Mangal"/>
+        <a:font script="Telu" typeface="Gautami"/>
+        <a:font script="Taml" typeface="Latha"/>
+        <a:font script="Syrc" typeface="Estrangelo Edessa"/>
+        <a:font script="Orya" typeface="Kalinga"/>
+        <a:font script="Mlym" typeface="Kartika"/>
+        <a:font script="Laoo" typeface="DokChampa"/>
+        <a:font script="Sinh" typeface="Iskoola Pota"/>
+        <a:font script="Mong" typeface="Mongolian Baiti"/>
+        <a:font script="Viet" typeface="Arial"/>
+        <a:font script="Uigh" typeface="Microsoft Uighur"/>
+        <a:font script="Geor" typeface="Sylfaen"/>
+        <a:font script="Armn" typeface="Arial"/>
+        <a:font script="Bugi" typeface="Leelawadee UI"/>
+        <a:font script="Bopo" typeface="Microsoft JhengHei"/>
+        <a:font script="Java" typeface="Javanese Text"/>
+        <a:font script="Lisu" typeface="Segoe UI"/>
+        <a:font script="Mymr" typeface="Myanmar Text"/>
+        <a:font script="Nkoo" typeface="Ebrima"/>
+        <a:font script="Olck" typeface="Nirmala UI"/>
+        <a:font script="Osma" typeface="Ebrima"/>
+        <a:font script="Phag" typeface="Phagspa"/>
+        <a:font script="Syrn" typeface="Estrangelo Edessa"/>
+        <a:font script="Syrj" typeface="Estrangelo Edessa"/>
+        <a:font script="Syre" typeface="Estrangelo Edessa"/>
+        <a:font script="Sora" typeface="Nirmala UI"/>
+        <a:font script="Tale" typeface="Microsoft Tai Le"/>
+        <a:font script="Talu" typeface="Microsoft New Tai Lue"/>
+        <a:font script="Tfng" typeface="Ebrima"/>
+      </a:minorFont>
+    </a:fontScheme>
+    <a:fmtScheme name="Office">
+      <a:fillStyleLst>
+        <a:solidFill>
+          <a:schemeClr val="phClr"/>
+        </a:solidFill>
+        <a:gradFill rotWithShape="1">
+          <a:gsLst>
+            <a:gs pos="0">
+              <a:schemeClr val="phClr">
+                <a:lumMod val="110000"/>
+                <a:satMod val="105000"/>
+                <a:tint val="67000"/>
+              </a:schemeClr>
+            </a:gs>
+            <a:gs pos="50000">
+              <a:schemeClr val="phClr">
+                <a:lumMod val="105000"/>
+                <a:satMod val="103000"/>
+                <a:tint val="73000"/>
+              </a:schemeClr>
+            </a:gs>
+            <a:gs pos="100000">
+              <a:schemeClr val="phClr">
+                <a:lumMod val="105000"/>
+                <a:satMod val="109000"/>
+                <a:tint val="81000"/>
+              </a:schemeClr>
+            </a:gs>
+          </a:gsLst>
+          <a:lin ang="5400000" scaled="0"/>
+        </a:gradFill>
+        <a:gradFill rotWithShape="1">
+          <a:gsLst>
+            <a:gs pos="0">
+              <a:schemeClr val="phClr">
+                <a:satMod val="103000"/>
+                <a:lumMod val="102000"/>
+                <a:tint val="94000"/>
+              </a:schemeClr>
+            </a:gs>
+            <a:gs pos="50000">
+              <a:schemeClr val="phClr">
+                <a:satMod val="110000"/>
+                <a:lumMod val="100000"/>
+                <a:shade val="100000"/>
+              </a:schemeClr>
+            </a:gs>
+            <a:gs pos="100000">
+              <a:schemeClr val="phClr">
+                <a:lumMod val="99000"/>
+                <a:satMod val="120000"/>
+                <a:shade val="78000"/>
+              </a:schemeClr>
+            </a:gs>
+          </a:gsLst>
+          <a:lin ang="5400000" scaled="0"/>
+        </a:gradFill>
+      </a:fillStyleLst>
+      <a:lnStyleLst>
+        <a:ln w="6350" cap="flat" cmpd="sng" algn="ctr">
+          <a:solidFill>
+            <a:schemeClr val="phClr"/>
+          </a:solidFill>
+          <a:prstDash val="solid"/>
+          <a:miter lim="800000"/>
+        </a:ln>
+        <a:ln w="12700" cap="flat" cmpd="sng" algn="ctr">
+          <a:solidFill>
+            <a:schemeClr val="phClr"/>
+          </a:solidFill>
+          <a:prstDash val="solid"/>
+          <a:miter lim="800000"/>
+        </a:ln>
+        <a:ln w="19050" cap="flat" cmpd="sng" algn="ctr">
+          <a:solidFill>
+            <a:schemeClr val="phClr"/>
+          </a:solidFill>
+          <a:prstDash val="solid"/>
+          <a:miter lim="800000"/>
+        </a:ln>
+      </a:lnStyleLst>
+      <a:effectStyleLst>
+        <a:effectStyle>
+          <a:effectLst/>
+        </a:effectStyle>
+        <a:effectStyle>
+          <a:effectLst/>
+        </a:effectStyle>
+        <a:effectStyle>
+          <a:effectLst>
+            <a:outerShdw blurRad="57150" dist="19050" dir="5400000" algn="ctr" rotWithShape="0">
+              <a:srgbClr val="000000">
+                <a:alpha val="63000"/>
+              </a:srgbClr>
+            </a:outerShdw>
+          </a:effectLst>
+        </a:effectStyle>
+      </a:effectStyleLst>
+      <a:bgFillStyleLst>
+        <a:solidFill>
+          <a:schemeClr val="phClr"/>
+        </a:solidFill>
+        <a:solidFill>
+          <a:schemeClr val="phClr">
+            <a:tint val="95000"/>
+            <a:satMod val="170000"/>
+          </a:schemeClr>
+        </a:solidFill>
+        <a:gradFill rotWithShape="1">
+          <a:gsLst>
+            <a:gs pos="0">
+              <a:schemeClr val="phClr">
+                <a:tint val="93000"/>
+                <a:satMod val="150000"/>
+                <a:shade val="98000"/>
+                <a:lumMod val="102000"/>
+              </a:schemeClr>
+            </a:gs>
+            <a:gs pos="50000">
+              <a:schemeClr val="phClr">
+                <a:tint val="98000"/>
+                <a:satMod val="130000"/>
+                <a:shade val="90000"/>
+                <a:lumMod val="103000"/>
+              </a:schemeClr>
+            </a:gs>
+            <a:gs pos="100000">
+              <a:schemeClr val="phClr">
+                <a:shade val="63000"/>
+                <a:satMod val="120000"/>
+              </a:schemeClr>
+            </a:gs>
+          </a:gsLst>
+          <a:lin ang="5400000" scaled="0"/>
+        </a:gradFill>
+      </a:bgFillStyleLst>
+    </a:fmtScheme>
+  </a:themeElements>
+  <a:objectDefaults/>
+  <a:extraClrSchemeLst/>
+  <a:extLst>
+    <a:ext uri="{05A4C25C-085E-4340-85A3-A5531E510DB2}">
+      <thm15:themeFamily xmlns:thm15="http://schemas.microsoft.com/office/thememl/2012/main" name="Office Theme" id="{62F939B6-93AF-4DB8-9C6B-D6C7DFDC589F}" vid="{4A3C46E8-61CC-4603-A589-7422A47A8E4A}"/>
+    </a:ext>
+  </a:extLst>
+</a:theme>
 </file>
</xml_diff>